<commit_message>
fix ppt and README
</commit_message>
<xml_diff>
--- a/final_demo.pptx
+++ b/final_demo.pptx
@@ -6,11 +6,12 @@
   </p:sldMasterIdLst>
   <p:sldIdLst>
     <p:sldId id="256" r:id="rId2"/>
-    <p:sldId id="261" r:id="rId3"/>
-    <p:sldId id="257" r:id="rId4"/>
+    <p:sldId id="262" r:id="rId3"/>
+    <p:sldId id="261" r:id="rId4"/>
     <p:sldId id="258" r:id="rId5"/>
-    <p:sldId id="259" r:id="rId6"/>
-    <p:sldId id="260" r:id="rId7"/>
+    <p:sldId id="257" r:id="rId6"/>
+    <p:sldId id="259" r:id="rId7"/>
+    <p:sldId id="260" r:id="rId8"/>
   </p:sldIdLst>
   <p:sldSz cx="12192000" cy="6858000"/>
   <p:notesSz cx="6858000" cy="9144000"/>
@@ -5846,6 +5847,679 @@
       </p:grpSpPr>
       <p:sp>
         <p:nvSpPr>
+          <p:cNvPr id="2" name="標題 1"/>
+          <p:cNvSpPr>
+            <a:spLocks noGrp="1"/>
+          </p:cNvSpPr>
+          <p:nvPr>
+            <p:ph type="title"/>
+          </p:nvPr>
+        </p:nvSpPr>
+        <p:spPr/>
+        <p:txBody>
+          <a:bodyPr/>
+          <a:lstStyle/>
+          <a:p>
+            <a:r>
+              <a:rPr lang="en-US" altLang="zh-TW" dirty="0" smtClean="0"/>
+              <a:t>Motivation</a:t>
+            </a:r>
+            <a:endParaRPr lang="zh-TW" altLang="en-US" dirty="0"/>
+          </a:p>
+        </p:txBody>
+      </p:sp>
+      <p:graphicFrame>
+        <p:nvGraphicFramePr>
+          <p:cNvPr id="4" name="內容版面配置區 3"/>
+          <p:cNvGraphicFramePr>
+            <a:graphicFrameLocks noGrp="1"/>
+          </p:cNvGraphicFramePr>
+          <p:nvPr>
+            <p:ph idx="1"/>
+            <p:extLst>
+              <p:ext uri="{D42A27DB-BD31-4B8C-83A1-F6EECF244321}">
+                <p14:modId xmlns:p14="http://schemas.microsoft.com/office/powerpoint/2010/main" val="3808945664"/>
+              </p:ext>
+            </p:extLst>
+          </p:nvPr>
+        </p:nvGraphicFramePr>
+        <p:xfrm>
+          <a:off x="263770" y="4815866"/>
+          <a:ext cx="11482752" cy="1188720"/>
+        </p:xfrm>
+        <a:graphic>
+          <a:graphicData uri="http://schemas.openxmlformats.org/drawingml/2006/table">
+            <a:tbl>
+              <a:tblPr firstRow="1" bandRow="1">
+                <a:tableStyleId>{5C22544A-7EE6-4342-B048-85BDC9FD1C3A}</a:tableStyleId>
+              </a:tblPr>
+              <a:tblGrid>
+                <a:gridCol w="1451278">
+                  <a:extLst>
+                    <a:ext uri="{9D8B030D-6E8A-4147-A177-3AD203B41FA5}">
+                      <a16:colId xmlns:a16="http://schemas.microsoft.com/office/drawing/2014/main" val="2407410849"/>
+                    </a:ext>
+                  </a:extLst>
+                </a:gridCol>
+                <a:gridCol w="994322">
+                  <a:extLst>
+                    <a:ext uri="{9D8B030D-6E8A-4147-A177-3AD203B41FA5}">
+                      <a16:colId xmlns:a16="http://schemas.microsoft.com/office/drawing/2014/main" val="3693949230"/>
+                    </a:ext>
+                  </a:extLst>
+                </a:gridCol>
+                <a:gridCol w="1004128">
+                  <a:extLst>
+                    <a:ext uri="{9D8B030D-6E8A-4147-A177-3AD203B41FA5}">
+                      <a16:colId xmlns:a16="http://schemas.microsoft.com/office/drawing/2014/main" val="4243875662"/>
+                    </a:ext>
+                  </a:extLst>
+                </a:gridCol>
+                <a:gridCol w="1004128">
+                  <a:extLst>
+                    <a:ext uri="{9D8B030D-6E8A-4147-A177-3AD203B41FA5}">
+                      <a16:colId xmlns:a16="http://schemas.microsoft.com/office/drawing/2014/main" val="2992120634"/>
+                    </a:ext>
+                  </a:extLst>
+                </a:gridCol>
+                <a:gridCol w="1004128">
+                  <a:extLst>
+                    <a:ext uri="{9D8B030D-6E8A-4147-A177-3AD203B41FA5}">
+                      <a16:colId xmlns:a16="http://schemas.microsoft.com/office/drawing/2014/main" val="1867942492"/>
+                    </a:ext>
+                  </a:extLst>
+                </a:gridCol>
+                <a:gridCol w="1004128">
+                  <a:extLst>
+                    <a:ext uri="{9D8B030D-6E8A-4147-A177-3AD203B41FA5}">
+                      <a16:colId xmlns:a16="http://schemas.microsoft.com/office/drawing/2014/main" val="2452384759"/>
+                    </a:ext>
+                  </a:extLst>
+                </a:gridCol>
+                <a:gridCol w="1004128">
+                  <a:extLst>
+                    <a:ext uri="{9D8B030D-6E8A-4147-A177-3AD203B41FA5}">
+                      <a16:colId xmlns:a16="http://schemas.microsoft.com/office/drawing/2014/main" val="1032808255"/>
+                    </a:ext>
+                  </a:extLst>
+                </a:gridCol>
+                <a:gridCol w="1004128">
+                  <a:extLst>
+                    <a:ext uri="{9D8B030D-6E8A-4147-A177-3AD203B41FA5}">
+                      <a16:colId xmlns:a16="http://schemas.microsoft.com/office/drawing/2014/main" val="1531103223"/>
+                    </a:ext>
+                  </a:extLst>
+                </a:gridCol>
+                <a:gridCol w="1004128">
+                  <a:extLst>
+                    <a:ext uri="{9D8B030D-6E8A-4147-A177-3AD203B41FA5}">
+                      <a16:colId xmlns:a16="http://schemas.microsoft.com/office/drawing/2014/main" val="4182859306"/>
+                    </a:ext>
+                  </a:extLst>
+                </a:gridCol>
+                <a:gridCol w="1004128">
+                  <a:extLst>
+                    <a:ext uri="{9D8B030D-6E8A-4147-A177-3AD203B41FA5}">
+                      <a16:colId xmlns:a16="http://schemas.microsoft.com/office/drawing/2014/main" val="2484112645"/>
+                    </a:ext>
+                  </a:extLst>
+                </a:gridCol>
+                <a:gridCol w="1004128">
+                  <a:extLst>
+                    <a:ext uri="{9D8B030D-6E8A-4147-A177-3AD203B41FA5}">
+                      <a16:colId xmlns:a16="http://schemas.microsoft.com/office/drawing/2014/main" val="1788546447"/>
+                    </a:ext>
+                  </a:extLst>
+                </a:gridCol>
+              </a:tblGrid>
+              <a:tr h="370840">
+                <a:tc>
+                  <a:txBody>
+                    <a:bodyPr/>
+                    <a:lstStyle/>
+                    <a:p>
+                      <a:r>
+                        <a:rPr lang="en-US" altLang="zh-TW" sz="2000" dirty="0" smtClean="0"/>
+                        <a:t>classes</a:t>
+                      </a:r>
+                      <a:endParaRPr lang="zh-TW" altLang="en-US" sz="2000" dirty="0"/>
+                    </a:p>
+                  </a:txBody>
+                  <a:tcPr/>
+                </a:tc>
+                <a:tc>
+                  <a:txBody>
+                    <a:bodyPr/>
+                    <a:lstStyle/>
+                    <a:p>
+                      <a:r>
+                        <a:rPr lang="en-US" altLang="zh-TW" sz="2000" dirty="0" smtClean="0"/>
+                        <a:t>0</a:t>
+                      </a:r>
+                      <a:endParaRPr lang="zh-TW" altLang="en-US" sz="2000" dirty="0"/>
+                    </a:p>
+                  </a:txBody>
+                  <a:tcPr/>
+                </a:tc>
+                <a:tc>
+                  <a:txBody>
+                    <a:bodyPr/>
+                    <a:lstStyle/>
+                    <a:p>
+                      <a:r>
+                        <a:rPr lang="en-US" altLang="zh-TW" sz="2000" dirty="0" smtClean="0"/>
+                        <a:t>1</a:t>
+                      </a:r>
+                      <a:endParaRPr lang="zh-TW" altLang="en-US" sz="2000" dirty="0"/>
+                    </a:p>
+                  </a:txBody>
+                  <a:tcPr/>
+                </a:tc>
+                <a:tc>
+                  <a:txBody>
+                    <a:bodyPr/>
+                    <a:lstStyle/>
+                    <a:p>
+                      <a:r>
+                        <a:rPr lang="en-US" altLang="zh-TW" sz="2000" dirty="0" smtClean="0"/>
+                        <a:t>2</a:t>
+                      </a:r>
+                      <a:endParaRPr lang="zh-TW" altLang="en-US" sz="2000" dirty="0"/>
+                    </a:p>
+                  </a:txBody>
+                  <a:tcPr/>
+                </a:tc>
+                <a:tc>
+                  <a:txBody>
+                    <a:bodyPr/>
+                    <a:lstStyle/>
+                    <a:p>
+                      <a:r>
+                        <a:rPr lang="en-US" altLang="zh-TW" sz="2000" dirty="0" smtClean="0"/>
+                        <a:t>3</a:t>
+                      </a:r>
+                      <a:endParaRPr lang="zh-TW" altLang="en-US" sz="2000" dirty="0"/>
+                    </a:p>
+                  </a:txBody>
+                  <a:tcPr/>
+                </a:tc>
+                <a:tc>
+                  <a:txBody>
+                    <a:bodyPr/>
+                    <a:lstStyle/>
+                    <a:p>
+                      <a:r>
+                        <a:rPr lang="en-US" altLang="zh-TW" sz="2000" dirty="0" smtClean="0"/>
+                        <a:t>4</a:t>
+                      </a:r>
+                      <a:endParaRPr lang="zh-TW" altLang="en-US" sz="2000" dirty="0"/>
+                    </a:p>
+                  </a:txBody>
+                  <a:tcPr/>
+                </a:tc>
+                <a:tc>
+                  <a:txBody>
+                    <a:bodyPr/>
+                    <a:lstStyle/>
+                    <a:p>
+                      <a:r>
+                        <a:rPr lang="en-US" altLang="zh-TW" sz="2000" dirty="0" smtClean="0"/>
+                        <a:t>5</a:t>
+                      </a:r>
+                      <a:endParaRPr lang="zh-TW" altLang="en-US" sz="2000" dirty="0"/>
+                    </a:p>
+                  </a:txBody>
+                  <a:tcPr/>
+                </a:tc>
+                <a:tc>
+                  <a:txBody>
+                    <a:bodyPr/>
+                    <a:lstStyle/>
+                    <a:p>
+                      <a:r>
+                        <a:rPr lang="en-US" altLang="zh-TW" sz="2000" dirty="0" smtClean="0"/>
+                        <a:t>6</a:t>
+                      </a:r>
+                      <a:endParaRPr lang="zh-TW" altLang="en-US" sz="2000" dirty="0"/>
+                    </a:p>
+                  </a:txBody>
+                  <a:tcPr/>
+                </a:tc>
+                <a:tc>
+                  <a:txBody>
+                    <a:bodyPr/>
+                    <a:lstStyle/>
+                    <a:p>
+                      <a:r>
+                        <a:rPr lang="en-US" altLang="zh-TW" sz="2000" dirty="0" smtClean="0"/>
+                        <a:t>7</a:t>
+                      </a:r>
+                      <a:endParaRPr lang="zh-TW" altLang="en-US" sz="2000" dirty="0"/>
+                    </a:p>
+                  </a:txBody>
+                  <a:tcPr/>
+                </a:tc>
+                <a:tc>
+                  <a:txBody>
+                    <a:bodyPr/>
+                    <a:lstStyle/>
+                    <a:p>
+                      <a:r>
+                        <a:rPr lang="en-US" altLang="zh-TW" sz="2000" dirty="0" smtClean="0"/>
+                        <a:t>8</a:t>
+                      </a:r>
+                      <a:endParaRPr lang="zh-TW" altLang="en-US" sz="2000" dirty="0"/>
+                    </a:p>
+                  </a:txBody>
+                  <a:tcPr/>
+                </a:tc>
+                <a:tc>
+                  <a:txBody>
+                    <a:bodyPr/>
+                    <a:lstStyle/>
+                    <a:p>
+                      <a:r>
+                        <a:rPr lang="en-US" altLang="zh-TW" sz="2000" dirty="0" smtClean="0"/>
+                        <a:t>9</a:t>
+                      </a:r>
+                      <a:endParaRPr lang="zh-TW" altLang="en-US" sz="2000" dirty="0"/>
+                    </a:p>
+                  </a:txBody>
+                  <a:tcPr/>
+                </a:tc>
+                <a:extLst>
+                  <a:ext uri="{0D108BD9-81ED-4DB2-BD59-A6C34878D82A}">
+                    <a16:rowId xmlns:a16="http://schemas.microsoft.com/office/drawing/2014/main" val="3494595557"/>
+                  </a:ext>
+                </a:extLst>
+              </a:tr>
+              <a:tr h="370840">
+                <a:tc>
+                  <a:txBody>
+                    <a:bodyPr/>
+                    <a:lstStyle/>
+                    <a:p>
+                      <a:r>
+                        <a:rPr lang="en-US" altLang="zh-TW" sz="2000" dirty="0" smtClean="0"/>
+                        <a:t>label</a:t>
+                      </a:r>
+                      <a:endParaRPr lang="zh-TW" altLang="en-US" sz="2000" dirty="0"/>
+                    </a:p>
+                  </a:txBody>
+                  <a:tcPr/>
+                </a:tc>
+                <a:tc>
+                  <a:txBody>
+                    <a:bodyPr/>
+                    <a:lstStyle/>
+                    <a:p>
+                      <a:r>
+                        <a:rPr lang="en-US" altLang="zh-TW" sz="2000" dirty="0" smtClean="0"/>
+                        <a:t>0</a:t>
+                      </a:r>
+                      <a:endParaRPr lang="zh-TW" altLang="en-US" sz="2000" dirty="0"/>
+                    </a:p>
+                  </a:txBody>
+                  <a:tcPr/>
+                </a:tc>
+                <a:tc>
+                  <a:txBody>
+                    <a:bodyPr/>
+                    <a:lstStyle/>
+                    <a:p>
+                      <a:r>
+                        <a:rPr lang="en-US" altLang="zh-TW" sz="2000" dirty="0" smtClean="0"/>
+                        <a:t>1</a:t>
+                      </a:r>
+                      <a:endParaRPr lang="zh-TW" altLang="en-US" sz="2000" dirty="0"/>
+                    </a:p>
+                  </a:txBody>
+                  <a:tcPr/>
+                </a:tc>
+                <a:tc>
+                  <a:txBody>
+                    <a:bodyPr/>
+                    <a:lstStyle/>
+                    <a:p>
+                      <a:r>
+                        <a:rPr lang="en-US" altLang="zh-TW" sz="2000" dirty="0" smtClean="0"/>
+                        <a:t>0</a:t>
+                      </a:r>
+                      <a:endParaRPr lang="zh-TW" altLang="en-US" sz="2000" dirty="0"/>
+                    </a:p>
+                  </a:txBody>
+                  <a:tcPr/>
+                </a:tc>
+                <a:tc>
+                  <a:txBody>
+                    <a:bodyPr/>
+                    <a:lstStyle/>
+                    <a:p>
+                      <a:r>
+                        <a:rPr lang="en-US" altLang="zh-TW" sz="2000" dirty="0" smtClean="0"/>
+                        <a:t>0</a:t>
+                      </a:r>
+                      <a:endParaRPr lang="zh-TW" altLang="en-US" sz="2000" dirty="0"/>
+                    </a:p>
+                  </a:txBody>
+                  <a:tcPr/>
+                </a:tc>
+                <a:tc>
+                  <a:txBody>
+                    <a:bodyPr/>
+                    <a:lstStyle/>
+                    <a:p>
+                      <a:r>
+                        <a:rPr lang="en-US" altLang="zh-TW" sz="2000" dirty="0" smtClean="0"/>
+                        <a:t>0</a:t>
+                      </a:r>
+                      <a:endParaRPr lang="zh-TW" altLang="en-US" sz="2000" dirty="0"/>
+                    </a:p>
+                  </a:txBody>
+                  <a:tcPr/>
+                </a:tc>
+                <a:tc>
+                  <a:txBody>
+                    <a:bodyPr/>
+                    <a:lstStyle/>
+                    <a:p>
+                      <a:r>
+                        <a:rPr lang="en-US" altLang="zh-TW" sz="2000" dirty="0" smtClean="0"/>
+                        <a:t>0</a:t>
+                      </a:r>
+                      <a:endParaRPr lang="zh-TW" altLang="en-US" sz="2000" dirty="0"/>
+                    </a:p>
+                  </a:txBody>
+                  <a:tcPr/>
+                </a:tc>
+                <a:tc>
+                  <a:txBody>
+                    <a:bodyPr/>
+                    <a:lstStyle/>
+                    <a:p>
+                      <a:r>
+                        <a:rPr lang="en-US" altLang="zh-TW" sz="2000" dirty="0" smtClean="0"/>
+                        <a:t>0</a:t>
+                      </a:r>
+                      <a:endParaRPr lang="zh-TW" altLang="en-US" sz="2000" dirty="0"/>
+                    </a:p>
+                  </a:txBody>
+                  <a:tcPr/>
+                </a:tc>
+                <a:tc>
+                  <a:txBody>
+                    <a:bodyPr/>
+                    <a:lstStyle/>
+                    <a:p>
+                      <a:r>
+                        <a:rPr lang="en-US" altLang="zh-TW" sz="2000" dirty="0" smtClean="0"/>
+                        <a:t>0</a:t>
+                      </a:r>
+                      <a:endParaRPr lang="zh-TW" altLang="en-US" sz="2000" dirty="0"/>
+                    </a:p>
+                  </a:txBody>
+                  <a:tcPr/>
+                </a:tc>
+                <a:tc>
+                  <a:txBody>
+                    <a:bodyPr/>
+                    <a:lstStyle/>
+                    <a:p>
+                      <a:r>
+                        <a:rPr lang="en-US" altLang="zh-TW" sz="2000" dirty="0" smtClean="0"/>
+                        <a:t>0</a:t>
+                      </a:r>
+                      <a:endParaRPr lang="zh-TW" altLang="en-US" sz="2000" dirty="0"/>
+                    </a:p>
+                  </a:txBody>
+                  <a:tcPr/>
+                </a:tc>
+                <a:tc>
+                  <a:txBody>
+                    <a:bodyPr/>
+                    <a:lstStyle/>
+                    <a:p>
+                      <a:r>
+                        <a:rPr lang="en-US" altLang="zh-TW" sz="2000" dirty="0" smtClean="0"/>
+                        <a:t>0</a:t>
+                      </a:r>
+                      <a:endParaRPr lang="zh-TW" altLang="en-US" sz="2000" dirty="0"/>
+                    </a:p>
+                  </a:txBody>
+                  <a:tcPr/>
+                </a:tc>
+                <a:extLst>
+                  <a:ext uri="{0D108BD9-81ED-4DB2-BD59-A6C34878D82A}">
+                    <a16:rowId xmlns:a16="http://schemas.microsoft.com/office/drawing/2014/main" val="1625389951"/>
+                  </a:ext>
+                </a:extLst>
+              </a:tr>
+              <a:tr h="370840">
+                <a:tc>
+                  <a:txBody>
+                    <a:bodyPr/>
+                    <a:lstStyle/>
+                    <a:p>
+                      <a:r>
+                        <a:rPr lang="en-US" altLang="zh-TW" sz="2000" dirty="0" smtClean="0"/>
+                        <a:t>probability</a:t>
+                      </a:r>
+                      <a:endParaRPr lang="zh-TW" altLang="en-US" sz="2000" dirty="0"/>
+                    </a:p>
+                  </a:txBody>
+                  <a:tcPr/>
+                </a:tc>
+                <a:tc>
+                  <a:txBody>
+                    <a:bodyPr/>
+                    <a:lstStyle/>
+                    <a:p>
+                      <a:r>
+                        <a:rPr lang="en-US" altLang="zh-TW" sz="2000" dirty="0" smtClean="0"/>
+                        <a:t>0.005</a:t>
+                      </a:r>
+                      <a:endParaRPr lang="zh-TW" altLang="en-US" sz="2000" dirty="0"/>
+                    </a:p>
+                  </a:txBody>
+                  <a:tcPr/>
+                </a:tc>
+                <a:tc>
+                  <a:txBody>
+                    <a:bodyPr/>
+                    <a:lstStyle/>
+                    <a:p>
+                      <a:r>
+                        <a:rPr lang="en-US" altLang="zh-TW" sz="2000" dirty="0" smtClean="0"/>
+                        <a:t>0.8</a:t>
+                      </a:r>
+                      <a:endParaRPr lang="zh-TW" altLang="en-US" sz="2000" dirty="0"/>
+                    </a:p>
+                  </a:txBody>
+                  <a:tcPr/>
+                </a:tc>
+                <a:tc>
+                  <a:txBody>
+                    <a:bodyPr/>
+                    <a:lstStyle/>
+                    <a:p>
+                      <a:r>
+                        <a:rPr lang="en-US" altLang="zh-TW" sz="2000" dirty="0" smtClean="0"/>
+                        <a:t>0.005</a:t>
+                      </a:r>
+                      <a:endParaRPr lang="zh-TW" altLang="en-US" sz="2000" dirty="0"/>
+                    </a:p>
+                  </a:txBody>
+                  <a:tcPr/>
+                </a:tc>
+                <a:tc>
+                  <a:txBody>
+                    <a:bodyPr/>
+                    <a:lstStyle/>
+                    <a:p>
+                      <a:r>
+                        <a:rPr lang="en-US" altLang="zh-TW" sz="2000" dirty="0" smtClean="0"/>
+                        <a:t>0.005</a:t>
+                      </a:r>
+                      <a:endParaRPr lang="zh-TW" altLang="en-US" sz="2000" dirty="0"/>
+                    </a:p>
+                  </a:txBody>
+                  <a:tcPr/>
+                </a:tc>
+                <a:tc>
+                  <a:txBody>
+                    <a:bodyPr/>
+                    <a:lstStyle/>
+                    <a:p>
+                      <a:r>
+                        <a:rPr lang="en-US" altLang="zh-TW" sz="2000" dirty="0" smtClean="0"/>
+                        <a:t>0.005</a:t>
+                      </a:r>
+                      <a:endParaRPr lang="zh-TW" altLang="en-US" sz="2000" dirty="0"/>
+                    </a:p>
+                  </a:txBody>
+                  <a:tcPr/>
+                </a:tc>
+                <a:tc>
+                  <a:txBody>
+                    <a:bodyPr/>
+                    <a:lstStyle/>
+                    <a:p>
+                      <a:r>
+                        <a:rPr lang="en-US" altLang="zh-TW" sz="2000" dirty="0" smtClean="0"/>
+                        <a:t>0.005</a:t>
+                      </a:r>
+                      <a:endParaRPr lang="zh-TW" altLang="en-US" sz="2000" dirty="0"/>
+                    </a:p>
+                  </a:txBody>
+                  <a:tcPr/>
+                </a:tc>
+                <a:tc>
+                  <a:txBody>
+                    <a:bodyPr/>
+                    <a:lstStyle/>
+                    <a:p>
+                      <a:r>
+                        <a:rPr lang="en-US" altLang="zh-TW" sz="2000" dirty="0" smtClean="0"/>
+                        <a:t>0.005</a:t>
+                      </a:r>
+                      <a:endParaRPr lang="zh-TW" altLang="en-US" sz="2000" dirty="0"/>
+                    </a:p>
+                  </a:txBody>
+                  <a:tcPr/>
+                </a:tc>
+                <a:tc>
+                  <a:txBody>
+                    <a:bodyPr/>
+                    <a:lstStyle/>
+                    <a:p>
+                      <a:r>
+                        <a:rPr lang="en-US" altLang="zh-TW" sz="2000" dirty="0" smtClean="0"/>
+                        <a:t>0.16</a:t>
+                      </a:r>
+                      <a:endParaRPr lang="zh-TW" altLang="en-US" sz="2000" dirty="0"/>
+                    </a:p>
+                  </a:txBody>
+                  <a:tcPr/>
+                </a:tc>
+                <a:tc>
+                  <a:txBody>
+                    <a:bodyPr/>
+                    <a:lstStyle/>
+                    <a:p>
+                      <a:r>
+                        <a:rPr lang="en-US" altLang="zh-TW" sz="2000" dirty="0" smtClean="0"/>
+                        <a:t>0.005</a:t>
+                      </a:r>
+                      <a:endParaRPr lang="zh-TW" altLang="en-US" sz="2000" dirty="0"/>
+                    </a:p>
+                  </a:txBody>
+                  <a:tcPr/>
+                </a:tc>
+                <a:tc>
+                  <a:txBody>
+                    <a:bodyPr/>
+                    <a:lstStyle/>
+                    <a:p>
+                      <a:r>
+                        <a:rPr lang="en-US" altLang="zh-TW" sz="2000" dirty="0" smtClean="0"/>
+                        <a:t>0.005</a:t>
+                      </a:r>
+                      <a:endParaRPr lang="zh-TW" altLang="en-US" sz="2000" dirty="0"/>
+                    </a:p>
+                  </a:txBody>
+                  <a:tcPr/>
+                </a:tc>
+                <a:extLst>
+                  <a:ext uri="{0D108BD9-81ED-4DB2-BD59-A6C34878D82A}">
+                    <a16:rowId xmlns:a16="http://schemas.microsoft.com/office/drawing/2014/main" val="2588321996"/>
+                  </a:ext>
+                </a:extLst>
+              </a:tr>
+            </a:tbl>
+          </a:graphicData>
+        </a:graphic>
+      </p:graphicFrame>
+      <p:pic>
+        <p:nvPicPr>
+          <p:cNvPr id="5" name="圖片 4" descr="一張含有 物件, 量表, 裝置 的圖片&#10;&#10;&#10;&#10;自動產生的描述">
+            <a:extLst>
+              <a:ext uri="{FF2B5EF4-FFF2-40B4-BE49-F238E27FC236}">
+                <a16:creationId xmlns:a16="http://schemas.microsoft.com/office/drawing/2014/main" id="{2AB0F37F-A7BB-F54F-95E9-A45542ECCE23}"/>
+              </a:ext>
+            </a:extLst>
+          </p:cNvPr>
+          <p:cNvPicPr>
+            <a:picLocks noChangeAspect="1"/>
+          </p:cNvPicPr>
+          <p:nvPr/>
+        </p:nvPicPr>
+        <p:blipFill rotWithShape="1">
+          <a:blip r:embed="rId2"/>
+          <a:srcRect l="20867" r="60717" b="49523"/>
+          <a:stretch/>
+        </p:blipFill>
+        <p:spPr>
+          <a:xfrm>
+            <a:off x="4593979" y="1561374"/>
+            <a:ext cx="2413489" cy="2314120"/>
+          </a:xfrm>
+          <a:prstGeom prst="rect">
+            <a:avLst/>
+          </a:prstGeom>
+        </p:spPr>
+      </p:pic>
+    </p:spTree>
+    <p:extLst>
+      <p:ext uri="{BB962C8B-B14F-4D97-AF65-F5344CB8AC3E}">
+        <p14:creationId xmlns:p14="http://schemas.microsoft.com/office/powerpoint/2010/main" val="2088486203"/>
+      </p:ext>
+    </p:extLst>
+  </p:cSld>
+  <p:clrMapOvr>
+    <a:masterClrMapping/>
+  </p:clrMapOvr>
+</p:sld>
+</file>
+
+<file path=ppt/slides/slide3.xml><?xml version="1.0" encoding="utf-8"?>
+<p:sld xmlns:a="http://schemas.openxmlformats.org/drawingml/2006/main" xmlns:r="http://schemas.openxmlformats.org/officeDocument/2006/relationships" xmlns:p="http://schemas.openxmlformats.org/presentationml/2006/main">
+  <p:cSld>
+    <p:spTree>
+      <p:nvGrpSpPr>
+        <p:cNvPr id="1" name=""/>
+        <p:cNvGrpSpPr/>
+        <p:nvPr/>
+      </p:nvGrpSpPr>
+      <p:grpSpPr>
+        <a:xfrm>
+          <a:off x="0" y="0"/>
+          <a:ext cx="0" cy="0"/>
+          <a:chOff x="0" y="0"/>
+          <a:chExt cx="0" cy="0"/>
+        </a:xfrm>
+      </p:grpSpPr>
+      <p:sp>
+        <p:nvSpPr>
           <p:cNvPr id="2" name="標題 1">
             <a:extLst>
               <a:ext uri="{FF2B5EF4-FFF2-40B4-BE49-F238E27FC236}">
@@ -5868,8 +6542,8 @@
           <a:lstStyle/>
           <a:p>
             <a:r>
-              <a:rPr kumimoji="1" lang="zh-CN" altLang="en-US" sz="4000" dirty="0"/>
-              <a:t>資料集</a:t>
+              <a:rPr kumimoji="1" lang="en-US" altLang="zh-TW" dirty="0" smtClean="0"/>
+              <a:t>Datasets</a:t>
             </a:r>
             <a:endParaRPr kumimoji="1" lang="zh-TW" altLang="en-US" sz="4000" dirty="0"/>
           </a:p>
@@ -5942,943 +6616,6 @@
     <p:extLst>
       <p:ext uri="{BB962C8B-B14F-4D97-AF65-F5344CB8AC3E}">
         <p14:creationId xmlns:p14="http://schemas.microsoft.com/office/powerpoint/2010/main" val="3721574167"/>
-      </p:ext>
-    </p:extLst>
-  </p:cSld>
-  <p:clrMapOvr>
-    <a:masterClrMapping/>
-  </p:clrMapOvr>
-</p:sld>
-</file>
-
-<file path=ppt/slides/slide3.xml><?xml version="1.0" encoding="utf-8"?>
-<p:sld xmlns:a="http://schemas.openxmlformats.org/drawingml/2006/main" xmlns:r="http://schemas.openxmlformats.org/officeDocument/2006/relationships" xmlns:p="http://schemas.openxmlformats.org/presentationml/2006/main">
-  <p:cSld>
-    <p:spTree>
-      <p:nvGrpSpPr>
-        <p:cNvPr id="1" name=""/>
-        <p:cNvGrpSpPr/>
-        <p:nvPr/>
-      </p:nvGrpSpPr>
-      <p:grpSpPr>
-        <a:xfrm>
-          <a:off x="0" y="0"/>
-          <a:ext cx="0" cy="0"/>
-          <a:chOff x="0" y="0"/>
-          <a:chExt cx="0" cy="0"/>
-        </a:xfrm>
-      </p:grpSpPr>
-      <p:sp>
-        <p:nvSpPr>
-          <p:cNvPr id="2" name="標題 1">
-            <a:extLst>
-              <a:ext uri="{FF2B5EF4-FFF2-40B4-BE49-F238E27FC236}">
-                <a16:creationId xmlns:a16="http://schemas.microsoft.com/office/drawing/2014/main" id="{F9D2C69C-8FFA-234D-A415-83F0D61E99B1}"/>
-              </a:ext>
-            </a:extLst>
-          </p:cNvPr>
-          <p:cNvSpPr>
-            <a:spLocks noGrp="1"/>
-          </p:cNvSpPr>
-          <p:nvPr>
-            <p:ph type="title"/>
-          </p:nvPr>
-        </p:nvSpPr>
-        <p:spPr/>
-        <p:txBody>
-          <a:bodyPr/>
-          <a:lstStyle/>
-          <a:p>
-            <a:r>
-              <a:rPr kumimoji="1" lang="en-US" altLang="zh-TW" b="1" u="sng" dirty="0"/>
-              <a:t>Target Model</a:t>
-            </a:r>
-            <a:r>
-              <a:rPr kumimoji="1" lang="en-US" altLang="zh-TW" dirty="0"/>
-              <a:t> </a:t>
-            </a:r>
-            <a:r>
-              <a:rPr kumimoji="1" lang="zh-CN" altLang="en-US" dirty="0"/>
-              <a:t>建立</a:t>
-            </a:r>
-            <a:endParaRPr kumimoji="1" lang="zh-TW" altLang="en-US" dirty="0"/>
-          </a:p>
-        </p:txBody>
-      </p:sp>
-      <p:sp>
-        <p:nvSpPr>
-          <p:cNvPr id="3" name="內容版面配置區 2">
-            <a:extLst>
-              <a:ext uri="{FF2B5EF4-FFF2-40B4-BE49-F238E27FC236}">
-                <a16:creationId xmlns:a16="http://schemas.microsoft.com/office/drawing/2014/main" id="{341CF6B0-BE5B-7342-B154-83E19791310D}"/>
-              </a:ext>
-            </a:extLst>
-          </p:cNvPr>
-          <p:cNvSpPr>
-            <a:spLocks noGrp="1"/>
-          </p:cNvSpPr>
-          <p:nvPr>
-            <p:ph idx="1"/>
-          </p:nvPr>
-        </p:nvSpPr>
-        <p:spPr/>
-        <p:txBody>
-          <a:bodyPr/>
-          <a:lstStyle/>
-          <a:p>
-            <a:endParaRPr kumimoji="1" lang="zh-TW" altLang="en-US" dirty="0"/>
-          </a:p>
-        </p:txBody>
-      </p:sp>
-      <p:grpSp>
-        <p:nvGrpSpPr>
-          <p:cNvPr id="10" name="群組 9">
-            <a:extLst>
-              <a:ext uri="{FF2B5EF4-FFF2-40B4-BE49-F238E27FC236}">
-                <a16:creationId xmlns:a16="http://schemas.microsoft.com/office/drawing/2014/main" id="{F3E40C42-BE5D-1B44-A8E8-FEFA0ABBBC23}"/>
-              </a:ext>
-            </a:extLst>
-          </p:cNvPr>
-          <p:cNvGrpSpPr/>
-          <p:nvPr/>
-        </p:nvGrpSpPr>
-        <p:grpSpPr>
-          <a:xfrm>
-            <a:off x="1930401" y="1889617"/>
-            <a:ext cx="6570132" cy="4688561"/>
-            <a:chOff x="1166818" y="23117199"/>
-            <a:chExt cx="9074898" cy="6476006"/>
-          </a:xfrm>
-        </p:grpSpPr>
-        <p:sp>
-          <p:nvSpPr>
-            <p:cNvPr id="11" name="圓角矩形 10">
-              <a:extLst>
-                <a:ext uri="{FF2B5EF4-FFF2-40B4-BE49-F238E27FC236}">
-                  <a16:creationId xmlns:a16="http://schemas.microsoft.com/office/drawing/2014/main" id="{AE0F239D-FE19-3544-BD17-9B1464D9E269}"/>
-                </a:ext>
-              </a:extLst>
-            </p:cNvPr>
-            <p:cNvSpPr/>
-            <p:nvPr/>
-          </p:nvSpPr>
-          <p:spPr>
-            <a:xfrm>
-              <a:off x="2579727" y="24566910"/>
-              <a:ext cx="5903576" cy="908288"/>
-            </a:xfrm>
-            <a:prstGeom prst="roundRect">
-              <a:avLst/>
-            </a:prstGeom>
-            <a:solidFill>
-              <a:schemeClr val="accent1"/>
-            </a:solidFill>
-          </p:spPr>
-          <p:style>
-            <a:lnRef idx="2">
-              <a:schemeClr val="accent1">
-                <a:shade val="50000"/>
-              </a:schemeClr>
-            </a:lnRef>
-            <a:fillRef idx="1">
-              <a:schemeClr val="accent1"/>
-            </a:fillRef>
-            <a:effectRef idx="0">
-              <a:schemeClr val="accent1"/>
-            </a:effectRef>
-            <a:fontRef idx="minor">
-              <a:schemeClr val="lt1"/>
-            </a:fontRef>
-          </p:style>
-          <p:txBody>
-            <a:bodyPr rtlCol="0" anchor="ctr"/>
-            <a:lstStyle/>
-            <a:p>
-              <a:pPr algn="ctr"/>
-              <a:r>
-                <a:rPr kumimoji="1" lang="en-US" altLang="zh-TW" sz="2000" dirty="0">
-                  <a:solidFill>
-                    <a:schemeClr val="bg1"/>
-                  </a:solidFill>
-                  <a:latin typeface="Microsoft JhengHei" panose="020B0604030504040204" pitchFamily="34" charset="-120"/>
-                  <a:ea typeface="Microsoft JhengHei" panose="020B0604030504040204" pitchFamily="34" charset="-120"/>
-                </a:rPr>
-                <a:t>Train Model</a:t>
-              </a:r>
-              <a:endParaRPr kumimoji="1" lang="zh-TW" altLang="en-US" sz="2000" dirty="0">
-                <a:solidFill>
-                  <a:schemeClr val="bg1"/>
-                </a:solidFill>
-                <a:latin typeface="Microsoft JhengHei" panose="020B0604030504040204" pitchFamily="34" charset="-120"/>
-                <a:ea typeface="Microsoft JhengHei" panose="020B0604030504040204" pitchFamily="34" charset="-120"/>
-              </a:endParaRPr>
-            </a:p>
-          </p:txBody>
-        </p:sp>
-        <p:sp>
-          <p:nvSpPr>
-            <p:cNvPr id="12" name="圓角矩形 11">
-              <a:extLst>
-                <a:ext uri="{FF2B5EF4-FFF2-40B4-BE49-F238E27FC236}">
-                  <a16:creationId xmlns:a16="http://schemas.microsoft.com/office/drawing/2014/main" id="{1892D5C7-EB47-6746-B314-661CF310298C}"/>
-                </a:ext>
-              </a:extLst>
-            </p:cNvPr>
-            <p:cNvSpPr/>
-            <p:nvPr/>
-          </p:nvSpPr>
-          <p:spPr>
-            <a:xfrm>
-              <a:off x="1361382" y="25993758"/>
-              <a:ext cx="2399642" cy="908288"/>
-            </a:xfrm>
-            <a:prstGeom prst="roundRect">
-              <a:avLst/>
-            </a:prstGeom>
-            <a:solidFill>
-              <a:schemeClr val="accent1"/>
-            </a:solidFill>
-          </p:spPr>
-          <p:style>
-            <a:lnRef idx="2">
-              <a:schemeClr val="accent1">
-                <a:shade val="50000"/>
-              </a:schemeClr>
-            </a:lnRef>
-            <a:fillRef idx="1">
-              <a:schemeClr val="accent1"/>
-            </a:fillRef>
-            <a:effectRef idx="0">
-              <a:schemeClr val="accent1"/>
-            </a:effectRef>
-            <a:fontRef idx="minor">
-              <a:schemeClr val="lt1"/>
-            </a:fontRef>
-          </p:style>
-          <p:txBody>
-            <a:bodyPr rtlCol="0" anchor="ctr"/>
-            <a:lstStyle/>
-            <a:p>
-              <a:pPr algn="ctr"/>
-              <a:r>
-                <a:rPr kumimoji="1" lang="en-US" altLang="zh-TW" sz="2000" dirty="0" err="1">
-                  <a:solidFill>
-                    <a:schemeClr val="bg1"/>
-                  </a:solidFill>
-                  <a:latin typeface="Microsoft JhengHei" panose="020B0604030504040204" pitchFamily="34" charset="-120"/>
-                  <a:ea typeface="Microsoft JhengHei" panose="020B0604030504040204" pitchFamily="34" charset="-120"/>
-                </a:rPr>
-                <a:t>Deepnet</a:t>
-              </a:r>
-              <a:endParaRPr kumimoji="1" lang="zh-TW" altLang="en-US" sz="2000" dirty="0">
-                <a:solidFill>
-                  <a:schemeClr val="bg1"/>
-                </a:solidFill>
-                <a:latin typeface="Microsoft JhengHei" panose="020B0604030504040204" pitchFamily="34" charset="-120"/>
-                <a:ea typeface="Microsoft JhengHei" panose="020B0604030504040204" pitchFamily="34" charset="-120"/>
-              </a:endParaRPr>
-            </a:p>
-          </p:txBody>
-        </p:sp>
-        <p:sp>
-          <p:nvSpPr>
-            <p:cNvPr id="13" name="圓角矩形 12">
-              <a:extLst>
-                <a:ext uri="{FF2B5EF4-FFF2-40B4-BE49-F238E27FC236}">
-                  <a16:creationId xmlns:a16="http://schemas.microsoft.com/office/drawing/2014/main" id="{D280BB8B-8612-E343-AD11-006BCD9F0B9C}"/>
-                </a:ext>
-              </a:extLst>
-            </p:cNvPr>
-            <p:cNvSpPr/>
-            <p:nvPr/>
-          </p:nvSpPr>
-          <p:spPr>
-            <a:xfrm>
-              <a:off x="4187230" y="25978260"/>
-              <a:ext cx="2814140" cy="908288"/>
-            </a:xfrm>
-            <a:prstGeom prst="roundRect">
-              <a:avLst/>
-            </a:prstGeom>
-            <a:solidFill>
-              <a:schemeClr val="accent1"/>
-            </a:solidFill>
-          </p:spPr>
-          <p:style>
-            <a:lnRef idx="2">
-              <a:schemeClr val="accent1">
-                <a:shade val="50000"/>
-              </a:schemeClr>
-            </a:lnRef>
-            <a:fillRef idx="1">
-              <a:schemeClr val="accent1"/>
-            </a:fillRef>
-            <a:effectRef idx="0">
-              <a:schemeClr val="accent1"/>
-            </a:effectRef>
-            <a:fontRef idx="minor">
-              <a:schemeClr val="lt1"/>
-            </a:fontRef>
-          </p:style>
-          <p:txBody>
-            <a:bodyPr rtlCol="0" anchor="ctr"/>
-            <a:lstStyle/>
-            <a:p>
-              <a:pPr algn="ctr"/>
-              <a:r>
-                <a:rPr kumimoji="1" lang="en-US" altLang="zh-TW" sz="2000" dirty="0">
-                  <a:solidFill>
-                    <a:schemeClr val="bg1"/>
-                  </a:solidFill>
-                  <a:latin typeface="Microsoft JhengHei" panose="020B0604030504040204" pitchFamily="34" charset="-120"/>
-                  <a:ea typeface="Microsoft JhengHei" panose="020B0604030504040204" pitchFamily="34" charset="-120"/>
-                </a:rPr>
-                <a:t>Decision Tree</a:t>
-              </a:r>
-              <a:endParaRPr kumimoji="1" lang="zh-TW" altLang="en-US" sz="2000" dirty="0">
-                <a:solidFill>
-                  <a:schemeClr val="bg1"/>
-                </a:solidFill>
-                <a:latin typeface="Microsoft JhengHei" panose="020B0604030504040204" pitchFamily="34" charset="-120"/>
-                <a:ea typeface="Microsoft JhengHei" panose="020B0604030504040204" pitchFamily="34" charset="-120"/>
-              </a:endParaRPr>
-            </a:p>
-          </p:txBody>
-        </p:sp>
-        <p:sp>
-          <p:nvSpPr>
-            <p:cNvPr id="14" name="圓角矩形 13">
-              <a:extLst>
-                <a:ext uri="{FF2B5EF4-FFF2-40B4-BE49-F238E27FC236}">
-                  <a16:creationId xmlns:a16="http://schemas.microsoft.com/office/drawing/2014/main" id="{A5F7FEC7-A0E0-4740-838D-5C3D7B8A4B52}"/>
-                </a:ext>
-              </a:extLst>
-            </p:cNvPr>
-            <p:cNvSpPr/>
-            <p:nvPr/>
-          </p:nvSpPr>
-          <p:spPr>
-            <a:xfrm>
-              <a:off x="7427576" y="25978260"/>
-              <a:ext cx="2814140" cy="908288"/>
-            </a:xfrm>
-            <a:prstGeom prst="roundRect">
-              <a:avLst/>
-            </a:prstGeom>
-            <a:solidFill>
-              <a:schemeClr val="accent1"/>
-            </a:solidFill>
-          </p:spPr>
-          <p:style>
-            <a:lnRef idx="2">
-              <a:schemeClr val="accent1">
-                <a:shade val="50000"/>
-              </a:schemeClr>
-            </a:lnRef>
-            <a:fillRef idx="1">
-              <a:schemeClr val="accent1"/>
-            </a:fillRef>
-            <a:effectRef idx="0">
-              <a:schemeClr val="accent1"/>
-            </a:effectRef>
-            <a:fontRef idx="minor">
-              <a:schemeClr val="lt1"/>
-            </a:fontRef>
-          </p:style>
-          <p:txBody>
-            <a:bodyPr rtlCol="0" anchor="ctr"/>
-            <a:lstStyle/>
-            <a:p>
-              <a:pPr algn="ctr"/>
-              <a:r>
-                <a:rPr kumimoji="1" lang="en-US" altLang="zh-TW" sz="2000" dirty="0">
-                  <a:solidFill>
-                    <a:schemeClr val="bg1"/>
-                  </a:solidFill>
-                  <a:latin typeface="Microsoft JhengHei" panose="020B0604030504040204" pitchFamily="34" charset="-120"/>
-                  <a:ea typeface="Microsoft JhengHei" panose="020B0604030504040204" pitchFamily="34" charset="-120"/>
-                </a:rPr>
-                <a:t>Ensemble</a:t>
-              </a:r>
-              <a:endParaRPr kumimoji="1" lang="zh-TW" altLang="en-US" sz="2000" dirty="0">
-                <a:solidFill>
-                  <a:schemeClr val="bg1"/>
-                </a:solidFill>
-                <a:latin typeface="Microsoft JhengHei" panose="020B0604030504040204" pitchFamily="34" charset="-120"/>
-                <a:ea typeface="Microsoft JhengHei" panose="020B0604030504040204" pitchFamily="34" charset="-120"/>
-              </a:endParaRPr>
-            </a:p>
-          </p:txBody>
-        </p:sp>
-        <p:sp>
-          <p:nvSpPr>
-            <p:cNvPr id="15" name="圓角矩形 14">
-              <a:extLst>
-                <a:ext uri="{FF2B5EF4-FFF2-40B4-BE49-F238E27FC236}">
-                  <a16:creationId xmlns:a16="http://schemas.microsoft.com/office/drawing/2014/main" id="{58F57881-3C14-5244-BF1F-48FD8CC91230}"/>
-                </a:ext>
-              </a:extLst>
-            </p:cNvPr>
-            <p:cNvSpPr/>
-            <p:nvPr/>
-          </p:nvSpPr>
-          <p:spPr>
-            <a:xfrm>
-              <a:off x="2573583" y="23117199"/>
-              <a:ext cx="5903576" cy="908288"/>
-            </a:xfrm>
-            <a:prstGeom prst="roundRect">
-              <a:avLst/>
-            </a:prstGeom>
-            <a:solidFill>
-              <a:schemeClr val="accent1"/>
-            </a:solidFill>
-          </p:spPr>
-          <p:style>
-            <a:lnRef idx="2">
-              <a:schemeClr val="accent1">
-                <a:shade val="50000"/>
-              </a:schemeClr>
-            </a:lnRef>
-            <a:fillRef idx="1">
-              <a:schemeClr val="accent1"/>
-            </a:fillRef>
-            <a:effectRef idx="0">
-              <a:schemeClr val="accent1"/>
-            </a:effectRef>
-            <a:fontRef idx="minor">
-              <a:schemeClr val="lt1"/>
-            </a:fontRef>
-          </p:style>
-          <p:txBody>
-            <a:bodyPr rtlCol="0" anchor="ctr"/>
-            <a:lstStyle/>
-            <a:p>
-              <a:pPr algn="ctr"/>
-              <a:r>
-                <a:rPr kumimoji="1" lang="en-US" altLang="zh-TW" sz="2000" dirty="0">
-                  <a:solidFill>
-                    <a:schemeClr val="bg1"/>
-                  </a:solidFill>
-                  <a:latin typeface="Microsoft JhengHei" panose="020B0604030504040204" pitchFamily="34" charset="-120"/>
-                  <a:ea typeface="Microsoft JhengHei" panose="020B0604030504040204" pitchFamily="34" charset="-120"/>
-                </a:rPr>
-                <a:t>Upload data to </a:t>
-              </a:r>
-              <a:r>
-                <a:rPr kumimoji="1" lang="en-US" altLang="zh-TW" sz="2000" b="1" dirty="0">
-                  <a:solidFill>
-                    <a:schemeClr val="bg1"/>
-                  </a:solidFill>
-                  <a:latin typeface="Microsoft JhengHei" panose="020B0604030504040204" pitchFamily="34" charset="-120"/>
-                  <a:ea typeface="Microsoft JhengHei" panose="020B0604030504040204" pitchFamily="34" charset="-120"/>
-                </a:rPr>
-                <a:t>BigML</a:t>
-              </a:r>
-              <a:endParaRPr kumimoji="1" lang="zh-TW" altLang="en-US" sz="2000" b="1" dirty="0">
-                <a:solidFill>
-                  <a:schemeClr val="bg1"/>
-                </a:solidFill>
-                <a:latin typeface="Microsoft JhengHei" panose="020B0604030504040204" pitchFamily="34" charset="-120"/>
-                <a:ea typeface="Microsoft JhengHei" panose="020B0604030504040204" pitchFamily="34" charset="-120"/>
-              </a:endParaRPr>
-            </a:p>
-          </p:txBody>
-        </p:sp>
-        <p:sp>
-          <p:nvSpPr>
-            <p:cNvPr id="16" name="向下箭號 15">
-              <a:extLst>
-                <a:ext uri="{FF2B5EF4-FFF2-40B4-BE49-F238E27FC236}">
-                  <a16:creationId xmlns:a16="http://schemas.microsoft.com/office/drawing/2014/main" id="{C6A4A9BC-03D2-7441-B806-AE833D5F5ECB}"/>
-                </a:ext>
-              </a:extLst>
-            </p:cNvPr>
-            <p:cNvSpPr/>
-            <p:nvPr/>
-          </p:nvSpPr>
-          <p:spPr>
-            <a:xfrm>
-              <a:off x="4976965" y="24028156"/>
-              <a:ext cx="1338107" cy="479109"/>
-            </a:xfrm>
-            <a:prstGeom prst="downArrow">
-              <a:avLst/>
-            </a:prstGeom>
-            <a:solidFill>
-              <a:schemeClr val="tx2">
-                <a:lumMod val="75000"/>
-              </a:schemeClr>
-            </a:solidFill>
-          </p:spPr>
-          <p:style>
-            <a:lnRef idx="2">
-              <a:schemeClr val="accent1">
-                <a:shade val="50000"/>
-              </a:schemeClr>
-            </a:lnRef>
-            <a:fillRef idx="1">
-              <a:schemeClr val="accent1"/>
-            </a:fillRef>
-            <a:effectRef idx="0">
-              <a:schemeClr val="accent1"/>
-            </a:effectRef>
-            <a:fontRef idx="minor">
-              <a:schemeClr val="lt1"/>
-            </a:fontRef>
-          </p:style>
-          <p:txBody>
-            <a:bodyPr rtlCol="0" anchor="ctr"/>
-            <a:lstStyle/>
-            <a:p>
-              <a:pPr algn="ctr"/>
-              <a:endParaRPr kumimoji="1" lang="zh-TW" altLang="en-US" sz="1200" dirty="0"/>
-            </a:p>
-          </p:txBody>
-        </p:sp>
-        <p:sp>
-          <p:nvSpPr>
-            <p:cNvPr id="17" name="向下箭號 16">
-              <a:extLst>
-                <a:ext uri="{FF2B5EF4-FFF2-40B4-BE49-F238E27FC236}">
-                  <a16:creationId xmlns:a16="http://schemas.microsoft.com/office/drawing/2014/main" id="{A9382121-20AF-8D49-81E7-AA00999743A4}"/>
-                </a:ext>
-              </a:extLst>
-            </p:cNvPr>
-            <p:cNvSpPr/>
-            <p:nvPr/>
-          </p:nvSpPr>
-          <p:spPr>
-            <a:xfrm>
-              <a:off x="2242574" y="25483873"/>
-              <a:ext cx="1338107" cy="479109"/>
-            </a:xfrm>
-            <a:prstGeom prst="downArrow">
-              <a:avLst/>
-            </a:prstGeom>
-            <a:solidFill>
-              <a:schemeClr val="tx2">
-                <a:lumMod val="75000"/>
-              </a:schemeClr>
-            </a:solidFill>
-          </p:spPr>
-          <p:style>
-            <a:lnRef idx="2">
-              <a:schemeClr val="accent1">
-                <a:shade val="50000"/>
-              </a:schemeClr>
-            </a:lnRef>
-            <a:fillRef idx="1">
-              <a:schemeClr val="accent1"/>
-            </a:fillRef>
-            <a:effectRef idx="0">
-              <a:schemeClr val="accent1"/>
-            </a:effectRef>
-            <a:fontRef idx="minor">
-              <a:schemeClr val="lt1"/>
-            </a:fontRef>
-          </p:style>
-          <p:txBody>
-            <a:bodyPr rtlCol="0" anchor="ctr"/>
-            <a:lstStyle/>
-            <a:p>
-              <a:pPr algn="ctr"/>
-              <a:endParaRPr kumimoji="1" lang="zh-TW" altLang="en-US" sz="1200" dirty="0"/>
-            </a:p>
-          </p:txBody>
-        </p:sp>
-        <p:sp>
-          <p:nvSpPr>
-            <p:cNvPr id="18" name="向下箭號 17">
-              <a:extLst>
-                <a:ext uri="{FF2B5EF4-FFF2-40B4-BE49-F238E27FC236}">
-                  <a16:creationId xmlns:a16="http://schemas.microsoft.com/office/drawing/2014/main" id="{77C85F1E-E056-1D4A-930C-1976EE84291C}"/>
-                </a:ext>
-              </a:extLst>
-            </p:cNvPr>
-            <p:cNvSpPr/>
-            <p:nvPr/>
-          </p:nvSpPr>
-          <p:spPr>
-            <a:xfrm>
-              <a:off x="5015143" y="26915350"/>
-              <a:ext cx="1338107" cy="479109"/>
-            </a:xfrm>
-            <a:prstGeom prst="downArrow">
-              <a:avLst/>
-            </a:prstGeom>
-            <a:solidFill>
-              <a:schemeClr val="tx2">
-                <a:lumMod val="75000"/>
-              </a:schemeClr>
-            </a:solidFill>
-          </p:spPr>
-          <p:style>
-            <a:lnRef idx="2">
-              <a:schemeClr val="accent1">
-                <a:shade val="50000"/>
-              </a:schemeClr>
-            </a:lnRef>
-            <a:fillRef idx="1">
-              <a:schemeClr val="accent1"/>
-            </a:fillRef>
-            <a:effectRef idx="0">
-              <a:schemeClr val="accent1"/>
-            </a:effectRef>
-            <a:fontRef idx="minor">
-              <a:schemeClr val="lt1"/>
-            </a:fontRef>
-          </p:style>
-          <p:txBody>
-            <a:bodyPr rtlCol="0" anchor="ctr"/>
-            <a:lstStyle/>
-            <a:p>
-              <a:pPr algn="ctr"/>
-              <a:endParaRPr kumimoji="1" lang="zh-TW" altLang="en-US" sz="1200" dirty="0"/>
-            </a:p>
-          </p:txBody>
-        </p:sp>
-        <p:sp>
-          <p:nvSpPr>
-            <p:cNvPr id="19" name="向下箭號 18">
-              <a:extLst>
-                <a:ext uri="{FF2B5EF4-FFF2-40B4-BE49-F238E27FC236}">
-                  <a16:creationId xmlns:a16="http://schemas.microsoft.com/office/drawing/2014/main" id="{CD6B3275-3FA8-A64B-B244-BBFC67C8B7A1}"/>
-                </a:ext>
-              </a:extLst>
-            </p:cNvPr>
-            <p:cNvSpPr/>
-            <p:nvPr/>
-          </p:nvSpPr>
-          <p:spPr>
-            <a:xfrm>
-              <a:off x="7455579" y="25483871"/>
-              <a:ext cx="1338107" cy="479109"/>
-            </a:xfrm>
-            <a:prstGeom prst="downArrow">
-              <a:avLst/>
-            </a:prstGeom>
-            <a:solidFill>
-              <a:schemeClr val="tx2">
-                <a:lumMod val="75000"/>
-              </a:schemeClr>
-            </a:solidFill>
-          </p:spPr>
-          <p:style>
-            <a:lnRef idx="2">
-              <a:schemeClr val="accent1">
-                <a:shade val="50000"/>
-              </a:schemeClr>
-            </a:lnRef>
-            <a:fillRef idx="1">
-              <a:schemeClr val="accent1"/>
-            </a:fillRef>
-            <a:effectRef idx="0">
-              <a:schemeClr val="accent1"/>
-            </a:effectRef>
-            <a:fontRef idx="minor">
-              <a:schemeClr val="lt1"/>
-            </a:fontRef>
-          </p:style>
-          <p:txBody>
-            <a:bodyPr rtlCol="0" anchor="ctr"/>
-            <a:lstStyle/>
-            <a:p>
-              <a:pPr algn="ctr"/>
-              <a:endParaRPr kumimoji="1" lang="zh-TW" altLang="en-US" sz="1200" dirty="0"/>
-            </a:p>
-          </p:txBody>
-        </p:sp>
-        <p:sp>
-          <p:nvSpPr>
-            <p:cNvPr id="20" name="圓角矩形 19">
-              <a:extLst>
-                <a:ext uri="{FF2B5EF4-FFF2-40B4-BE49-F238E27FC236}">
-                  <a16:creationId xmlns:a16="http://schemas.microsoft.com/office/drawing/2014/main" id="{8423031B-48CE-AC46-A388-08C2739A7794}"/>
-                </a:ext>
-              </a:extLst>
-            </p:cNvPr>
-            <p:cNvSpPr/>
-            <p:nvPr/>
-          </p:nvSpPr>
-          <p:spPr>
-            <a:xfrm>
-              <a:off x="1166818" y="28500085"/>
-              <a:ext cx="4278907" cy="1093120"/>
-            </a:xfrm>
-            <a:prstGeom prst="roundRect">
-              <a:avLst/>
-            </a:prstGeom>
-            <a:solidFill>
-              <a:schemeClr val="accent1"/>
-            </a:solidFill>
-          </p:spPr>
-          <p:style>
-            <a:lnRef idx="2">
-              <a:schemeClr val="accent1">
-                <a:shade val="50000"/>
-              </a:schemeClr>
-            </a:lnRef>
-            <a:fillRef idx="1">
-              <a:schemeClr val="accent1"/>
-            </a:fillRef>
-            <a:effectRef idx="0">
-              <a:schemeClr val="accent1"/>
-            </a:effectRef>
-            <a:fontRef idx="minor">
-              <a:schemeClr val="lt1"/>
-            </a:fontRef>
-          </p:style>
-          <p:txBody>
-            <a:bodyPr rtlCol="0" anchor="ctr"/>
-            <a:lstStyle/>
-            <a:p>
-              <a:pPr algn="ctr"/>
-              <a:r>
-                <a:rPr kumimoji="1" lang="en-US" altLang="zh-TW" sz="2000" dirty="0">
-                  <a:solidFill>
-                    <a:schemeClr val="bg1"/>
-                  </a:solidFill>
-                  <a:latin typeface="Microsoft JhengHei" panose="020B0604030504040204" pitchFamily="34" charset="-120"/>
-                  <a:ea typeface="Microsoft JhengHei" panose="020B0604030504040204" pitchFamily="34" charset="-120"/>
-                </a:rPr>
-                <a:t>Local : </a:t>
-              </a:r>
-            </a:p>
-            <a:p>
-              <a:pPr algn="ctr"/>
-              <a:r>
-                <a:rPr kumimoji="1" lang="en-US" altLang="zh-TW" sz="2000" dirty="0">
-                  <a:solidFill>
-                    <a:schemeClr val="bg1"/>
-                  </a:solidFill>
-                  <a:latin typeface="Microsoft JhengHei" panose="020B0604030504040204" pitchFamily="34" charset="-120"/>
-                  <a:ea typeface="Microsoft JhengHei" panose="020B0604030504040204" pitchFamily="34" charset="-120"/>
-                </a:rPr>
-                <a:t>Model parameters</a:t>
-              </a:r>
-              <a:endParaRPr kumimoji="1" lang="zh-TW" altLang="en-US" sz="2000" dirty="0">
-                <a:solidFill>
-                  <a:schemeClr val="bg1"/>
-                </a:solidFill>
-                <a:latin typeface="Microsoft JhengHei" panose="020B0604030504040204" pitchFamily="34" charset="-120"/>
-                <a:ea typeface="Microsoft JhengHei" panose="020B0604030504040204" pitchFamily="34" charset="-120"/>
-              </a:endParaRPr>
-            </a:p>
-          </p:txBody>
-        </p:sp>
-        <p:sp>
-          <p:nvSpPr>
-            <p:cNvPr id="21" name="圓角矩形 20">
-              <a:extLst>
-                <a:ext uri="{FF2B5EF4-FFF2-40B4-BE49-F238E27FC236}">
-                  <a16:creationId xmlns:a16="http://schemas.microsoft.com/office/drawing/2014/main" id="{1906E4A1-3BA2-3C4D-9731-9ADAB56A87A9}"/>
-                </a:ext>
-              </a:extLst>
-            </p:cNvPr>
-            <p:cNvSpPr/>
-            <p:nvPr/>
-          </p:nvSpPr>
-          <p:spPr>
-            <a:xfrm>
-              <a:off x="5571000" y="28500085"/>
-              <a:ext cx="4601420" cy="1088702"/>
-            </a:xfrm>
-            <a:prstGeom prst="roundRect">
-              <a:avLst/>
-            </a:prstGeom>
-            <a:solidFill>
-              <a:schemeClr val="accent1"/>
-            </a:solidFill>
-          </p:spPr>
-          <p:style>
-            <a:lnRef idx="2">
-              <a:schemeClr val="accent1">
-                <a:shade val="50000"/>
-              </a:schemeClr>
-            </a:lnRef>
-            <a:fillRef idx="1">
-              <a:schemeClr val="accent1"/>
-            </a:fillRef>
-            <a:effectRef idx="0">
-              <a:schemeClr val="accent1"/>
-            </a:effectRef>
-            <a:fontRef idx="minor">
-              <a:schemeClr val="lt1"/>
-            </a:fontRef>
-          </p:style>
-          <p:txBody>
-            <a:bodyPr rtlCol="0" anchor="ctr"/>
-            <a:lstStyle/>
-            <a:p>
-              <a:pPr algn="ctr"/>
-              <a:r>
-                <a:rPr kumimoji="1" lang="en-US" altLang="zh-TW" sz="2000" dirty="0">
-                  <a:solidFill>
-                    <a:schemeClr val="bg1"/>
-                  </a:solidFill>
-                  <a:latin typeface="Microsoft JhengHei" panose="020B0604030504040204" pitchFamily="34" charset="-120"/>
-                  <a:ea typeface="Microsoft JhengHei" panose="020B0604030504040204" pitchFamily="34" charset="-120"/>
-                </a:rPr>
-                <a:t>BigML Server : </a:t>
-              </a:r>
-            </a:p>
-            <a:p>
-              <a:pPr algn="ctr"/>
-              <a:r>
-                <a:rPr kumimoji="1" lang="en-US" altLang="zh-TW" sz="2000" dirty="0">
-                  <a:solidFill>
-                    <a:schemeClr val="bg1"/>
-                  </a:solidFill>
-                  <a:latin typeface="Microsoft JhengHei" panose="020B0604030504040204" pitchFamily="34" charset="-120"/>
-                  <a:ea typeface="Microsoft JhengHei" panose="020B0604030504040204" pitchFamily="34" charset="-120"/>
-                </a:rPr>
-                <a:t>Available for prediction</a:t>
-              </a:r>
-            </a:p>
-          </p:txBody>
-        </p:sp>
-        <p:sp>
-          <p:nvSpPr>
-            <p:cNvPr id="22" name="向下箭號 21">
-              <a:extLst>
-                <a:ext uri="{FF2B5EF4-FFF2-40B4-BE49-F238E27FC236}">
-                  <a16:creationId xmlns:a16="http://schemas.microsoft.com/office/drawing/2014/main" id="{0F8DE2E6-1B71-A54D-92CC-42FD0B41B360}"/>
-                </a:ext>
-              </a:extLst>
-            </p:cNvPr>
-            <p:cNvSpPr/>
-            <p:nvPr/>
-          </p:nvSpPr>
-          <p:spPr>
-            <a:xfrm>
-              <a:off x="5077890" y="25515957"/>
-              <a:ext cx="1338107" cy="479109"/>
-            </a:xfrm>
-            <a:prstGeom prst="downArrow">
-              <a:avLst/>
-            </a:prstGeom>
-            <a:solidFill>
-              <a:schemeClr val="tx2">
-                <a:lumMod val="75000"/>
-              </a:schemeClr>
-            </a:solidFill>
-          </p:spPr>
-          <p:style>
-            <a:lnRef idx="2">
-              <a:schemeClr val="accent1">
-                <a:shade val="50000"/>
-              </a:schemeClr>
-            </a:lnRef>
-            <a:fillRef idx="1">
-              <a:schemeClr val="accent1"/>
-            </a:fillRef>
-            <a:effectRef idx="0">
-              <a:schemeClr val="accent1"/>
-            </a:effectRef>
-            <a:fontRef idx="minor">
-              <a:schemeClr val="lt1"/>
-            </a:fontRef>
-          </p:style>
-          <p:txBody>
-            <a:bodyPr rtlCol="0" anchor="ctr"/>
-            <a:lstStyle/>
-            <a:p>
-              <a:pPr algn="ctr"/>
-              <a:endParaRPr kumimoji="1" lang="zh-TW" altLang="en-US" sz="1200" dirty="0"/>
-            </a:p>
-          </p:txBody>
-        </p:sp>
-        <p:sp>
-          <p:nvSpPr>
-            <p:cNvPr id="23" name="圓角矩形 22">
-              <a:extLst>
-                <a:ext uri="{FF2B5EF4-FFF2-40B4-BE49-F238E27FC236}">
-                  <a16:creationId xmlns:a16="http://schemas.microsoft.com/office/drawing/2014/main" id="{76755201-5237-B444-866E-41D89F55A754}"/>
-                </a:ext>
-              </a:extLst>
-            </p:cNvPr>
-            <p:cNvSpPr/>
-            <p:nvPr/>
-          </p:nvSpPr>
-          <p:spPr>
-            <a:xfrm>
-              <a:off x="2766070" y="27429677"/>
-              <a:ext cx="5903576" cy="908288"/>
-            </a:xfrm>
-            <a:prstGeom prst="roundRect">
-              <a:avLst/>
-            </a:prstGeom>
-            <a:solidFill>
-              <a:schemeClr val="accent1"/>
-            </a:solidFill>
-          </p:spPr>
-          <p:style>
-            <a:lnRef idx="2">
-              <a:schemeClr val="accent1">
-                <a:shade val="50000"/>
-              </a:schemeClr>
-            </a:lnRef>
-            <a:fillRef idx="1">
-              <a:schemeClr val="accent1"/>
-            </a:fillRef>
-            <a:effectRef idx="0">
-              <a:schemeClr val="accent1"/>
-            </a:effectRef>
-            <a:fontRef idx="minor">
-              <a:schemeClr val="lt1"/>
-            </a:fontRef>
-          </p:style>
-          <p:txBody>
-            <a:bodyPr rtlCol="0" anchor="ctr"/>
-            <a:lstStyle/>
-            <a:p>
-              <a:pPr algn="ctr"/>
-              <a:r>
-                <a:rPr kumimoji="1" lang="en-US" altLang="zh-TW" sz="2000" b="1" u="sng" dirty="0">
-                  <a:solidFill>
-                    <a:schemeClr val="bg1"/>
-                  </a:solidFill>
-                  <a:latin typeface="Microsoft JhengHei" panose="020B0604030504040204" pitchFamily="34" charset="-120"/>
-                  <a:ea typeface="Microsoft JhengHei" panose="020B0604030504040204" pitchFamily="34" charset="-120"/>
-                </a:rPr>
-                <a:t>Target Model</a:t>
-              </a:r>
-              <a:r>
-                <a:rPr kumimoji="1" lang="en-US" altLang="zh-TW" sz="2000" b="1" dirty="0">
-                  <a:solidFill>
-                    <a:schemeClr val="bg1"/>
-                  </a:solidFill>
-                  <a:latin typeface="Microsoft JhengHei" panose="020B0604030504040204" pitchFamily="34" charset="-120"/>
-                  <a:ea typeface="Microsoft JhengHei" panose="020B0604030504040204" pitchFamily="34" charset="-120"/>
-                </a:rPr>
-                <a:t> </a:t>
-              </a:r>
-              <a:r>
-                <a:rPr kumimoji="1" lang="en-US" altLang="zh-TW" sz="2000" dirty="0">
-                  <a:solidFill>
-                    <a:schemeClr val="bg1"/>
-                  </a:solidFill>
-                  <a:latin typeface="Microsoft JhengHei" panose="020B0604030504040204" pitchFamily="34" charset="-120"/>
-                  <a:ea typeface="Microsoft JhengHei" panose="020B0604030504040204" pitchFamily="34" charset="-120"/>
-                </a:rPr>
-                <a:t>Available</a:t>
-              </a:r>
-              <a:endParaRPr kumimoji="1" lang="zh-TW" altLang="en-US" sz="2000" dirty="0">
-                <a:solidFill>
-                  <a:schemeClr val="bg1"/>
-                </a:solidFill>
-                <a:latin typeface="Microsoft JhengHei" panose="020B0604030504040204" pitchFamily="34" charset="-120"/>
-                <a:ea typeface="Microsoft JhengHei" panose="020B0604030504040204" pitchFamily="34" charset="-120"/>
-              </a:endParaRPr>
-            </a:p>
-          </p:txBody>
-        </p:sp>
-      </p:grpSp>
-    </p:spTree>
-    <p:extLst>
-      <p:ext uri="{BB962C8B-B14F-4D97-AF65-F5344CB8AC3E}">
-        <p14:creationId xmlns:p14="http://schemas.microsoft.com/office/powerpoint/2010/main" val="318089992"/>
       </p:ext>
     </p:extLst>
   </p:cSld>
@@ -7197,6 +6934,16 @@
             <a:p>
               <a:pPr algn="ctr"/>
               <a:r>
+                <a:rPr kumimoji="1" lang="en-US" altLang="zh-TW" sz="2000" dirty="0" smtClean="0">
+                  <a:solidFill>
+                    <a:schemeClr val="bg1"/>
+                  </a:solidFill>
+                  <a:latin typeface="Microsoft JhengHei" panose="020B0604030504040204" pitchFamily="34" charset="-120"/>
+                  <a:ea typeface="Microsoft JhengHei" panose="020B0604030504040204" pitchFamily="34" charset="-120"/>
+                </a:rPr>
+                <a:t>Target </a:t>
+              </a:r>
+              <a:r>
                 <a:rPr kumimoji="1" lang="en-US" altLang="zh-TW" sz="2000" dirty="0">
                   <a:solidFill>
                     <a:schemeClr val="bg1"/>
@@ -7204,7 +6951,7 @@
                   <a:latin typeface="Microsoft JhengHei" panose="020B0604030504040204" pitchFamily="34" charset="-120"/>
                   <a:ea typeface="Microsoft JhengHei" panose="020B0604030504040204" pitchFamily="34" charset="-120"/>
                 </a:rPr>
-                <a:t>Prediction of Target model (pre-trained)</a:t>
+                <a:t>model (pre-trained)</a:t>
               </a:r>
               <a:endParaRPr kumimoji="1" lang="zh-TW" altLang="en-US" sz="2000" dirty="0">
                 <a:solidFill>
@@ -7993,6 +7740,943 @@
           <p:cNvPr id="2" name="標題 1">
             <a:extLst>
               <a:ext uri="{FF2B5EF4-FFF2-40B4-BE49-F238E27FC236}">
+                <a16:creationId xmlns:a16="http://schemas.microsoft.com/office/drawing/2014/main" id="{F9D2C69C-8FFA-234D-A415-83F0D61E99B1}"/>
+              </a:ext>
+            </a:extLst>
+          </p:cNvPr>
+          <p:cNvSpPr>
+            <a:spLocks noGrp="1"/>
+          </p:cNvSpPr>
+          <p:nvPr>
+            <p:ph type="title"/>
+          </p:nvPr>
+        </p:nvSpPr>
+        <p:spPr/>
+        <p:txBody>
+          <a:bodyPr/>
+          <a:lstStyle/>
+          <a:p>
+            <a:r>
+              <a:rPr kumimoji="1" lang="en-US" altLang="zh-TW" b="1" u="sng" dirty="0"/>
+              <a:t>Target Model</a:t>
+            </a:r>
+            <a:r>
+              <a:rPr kumimoji="1" lang="en-US" altLang="zh-TW" dirty="0"/>
+              <a:t> </a:t>
+            </a:r>
+            <a:r>
+              <a:rPr kumimoji="1" lang="zh-CN" altLang="en-US" dirty="0"/>
+              <a:t>建立</a:t>
+            </a:r>
+            <a:endParaRPr kumimoji="1" lang="zh-TW" altLang="en-US" dirty="0"/>
+          </a:p>
+        </p:txBody>
+      </p:sp>
+      <p:sp>
+        <p:nvSpPr>
+          <p:cNvPr id="3" name="內容版面配置區 2">
+            <a:extLst>
+              <a:ext uri="{FF2B5EF4-FFF2-40B4-BE49-F238E27FC236}">
+                <a16:creationId xmlns:a16="http://schemas.microsoft.com/office/drawing/2014/main" id="{341CF6B0-BE5B-7342-B154-83E19791310D}"/>
+              </a:ext>
+            </a:extLst>
+          </p:cNvPr>
+          <p:cNvSpPr>
+            <a:spLocks noGrp="1"/>
+          </p:cNvSpPr>
+          <p:nvPr>
+            <p:ph idx="1"/>
+          </p:nvPr>
+        </p:nvSpPr>
+        <p:spPr/>
+        <p:txBody>
+          <a:bodyPr/>
+          <a:lstStyle/>
+          <a:p>
+            <a:endParaRPr kumimoji="1" lang="zh-TW" altLang="en-US" dirty="0"/>
+          </a:p>
+        </p:txBody>
+      </p:sp>
+      <p:grpSp>
+        <p:nvGrpSpPr>
+          <p:cNvPr id="10" name="群組 9">
+            <a:extLst>
+              <a:ext uri="{FF2B5EF4-FFF2-40B4-BE49-F238E27FC236}">
+                <a16:creationId xmlns:a16="http://schemas.microsoft.com/office/drawing/2014/main" id="{F3E40C42-BE5D-1B44-A8E8-FEFA0ABBBC23}"/>
+              </a:ext>
+            </a:extLst>
+          </p:cNvPr>
+          <p:cNvGrpSpPr/>
+          <p:nvPr/>
+        </p:nvGrpSpPr>
+        <p:grpSpPr>
+          <a:xfrm>
+            <a:off x="1930401" y="1889617"/>
+            <a:ext cx="6570132" cy="4688561"/>
+            <a:chOff x="1166818" y="23117199"/>
+            <a:chExt cx="9074898" cy="6476006"/>
+          </a:xfrm>
+        </p:grpSpPr>
+        <p:sp>
+          <p:nvSpPr>
+            <p:cNvPr id="11" name="圓角矩形 10">
+              <a:extLst>
+                <a:ext uri="{FF2B5EF4-FFF2-40B4-BE49-F238E27FC236}">
+                  <a16:creationId xmlns:a16="http://schemas.microsoft.com/office/drawing/2014/main" id="{AE0F239D-FE19-3544-BD17-9B1464D9E269}"/>
+                </a:ext>
+              </a:extLst>
+            </p:cNvPr>
+            <p:cNvSpPr/>
+            <p:nvPr/>
+          </p:nvSpPr>
+          <p:spPr>
+            <a:xfrm>
+              <a:off x="2579727" y="24566910"/>
+              <a:ext cx="5903576" cy="908288"/>
+            </a:xfrm>
+            <a:prstGeom prst="roundRect">
+              <a:avLst/>
+            </a:prstGeom>
+            <a:solidFill>
+              <a:schemeClr val="accent1"/>
+            </a:solidFill>
+          </p:spPr>
+          <p:style>
+            <a:lnRef idx="2">
+              <a:schemeClr val="accent1">
+                <a:shade val="50000"/>
+              </a:schemeClr>
+            </a:lnRef>
+            <a:fillRef idx="1">
+              <a:schemeClr val="accent1"/>
+            </a:fillRef>
+            <a:effectRef idx="0">
+              <a:schemeClr val="accent1"/>
+            </a:effectRef>
+            <a:fontRef idx="minor">
+              <a:schemeClr val="lt1"/>
+            </a:fontRef>
+          </p:style>
+          <p:txBody>
+            <a:bodyPr rtlCol="0" anchor="ctr"/>
+            <a:lstStyle/>
+            <a:p>
+              <a:pPr algn="ctr"/>
+              <a:r>
+                <a:rPr kumimoji="1" lang="en-US" altLang="zh-TW" sz="2000" dirty="0">
+                  <a:solidFill>
+                    <a:schemeClr val="bg1"/>
+                  </a:solidFill>
+                  <a:latin typeface="Microsoft JhengHei" panose="020B0604030504040204" pitchFamily="34" charset="-120"/>
+                  <a:ea typeface="Microsoft JhengHei" panose="020B0604030504040204" pitchFamily="34" charset="-120"/>
+                </a:rPr>
+                <a:t>Train Model</a:t>
+              </a:r>
+              <a:endParaRPr kumimoji="1" lang="zh-TW" altLang="en-US" sz="2000" dirty="0">
+                <a:solidFill>
+                  <a:schemeClr val="bg1"/>
+                </a:solidFill>
+                <a:latin typeface="Microsoft JhengHei" panose="020B0604030504040204" pitchFamily="34" charset="-120"/>
+                <a:ea typeface="Microsoft JhengHei" panose="020B0604030504040204" pitchFamily="34" charset="-120"/>
+              </a:endParaRPr>
+            </a:p>
+          </p:txBody>
+        </p:sp>
+        <p:sp>
+          <p:nvSpPr>
+            <p:cNvPr id="12" name="圓角矩形 11">
+              <a:extLst>
+                <a:ext uri="{FF2B5EF4-FFF2-40B4-BE49-F238E27FC236}">
+                  <a16:creationId xmlns:a16="http://schemas.microsoft.com/office/drawing/2014/main" id="{1892D5C7-EB47-6746-B314-661CF310298C}"/>
+                </a:ext>
+              </a:extLst>
+            </p:cNvPr>
+            <p:cNvSpPr/>
+            <p:nvPr/>
+          </p:nvSpPr>
+          <p:spPr>
+            <a:xfrm>
+              <a:off x="1361382" y="25993758"/>
+              <a:ext cx="2399642" cy="908288"/>
+            </a:xfrm>
+            <a:prstGeom prst="roundRect">
+              <a:avLst/>
+            </a:prstGeom>
+            <a:solidFill>
+              <a:schemeClr val="accent1"/>
+            </a:solidFill>
+          </p:spPr>
+          <p:style>
+            <a:lnRef idx="2">
+              <a:schemeClr val="accent1">
+                <a:shade val="50000"/>
+              </a:schemeClr>
+            </a:lnRef>
+            <a:fillRef idx="1">
+              <a:schemeClr val="accent1"/>
+            </a:fillRef>
+            <a:effectRef idx="0">
+              <a:schemeClr val="accent1"/>
+            </a:effectRef>
+            <a:fontRef idx="minor">
+              <a:schemeClr val="lt1"/>
+            </a:fontRef>
+          </p:style>
+          <p:txBody>
+            <a:bodyPr rtlCol="0" anchor="ctr"/>
+            <a:lstStyle/>
+            <a:p>
+              <a:pPr algn="ctr"/>
+              <a:r>
+                <a:rPr kumimoji="1" lang="en-US" altLang="zh-TW" sz="2000" dirty="0" err="1">
+                  <a:solidFill>
+                    <a:schemeClr val="bg1"/>
+                  </a:solidFill>
+                  <a:latin typeface="Microsoft JhengHei" panose="020B0604030504040204" pitchFamily="34" charset="-120"/>
+                  <a:ea typeface="Microsoft JhengHei" panose="020B0604030504040204" pitchFamily="34" charset="-120"/>
+                </a:rPr>
+                <a:t>Deepnet</a:t>
+              </a:r>
+              <a:endParaRPr kumimoji="1" lang="zh-TW" altLang="en-US" sz="2000" dirty="0">
+                <a:solidFill>
+                  <a:schemeClr val="bg1"/>
+                </a:solidFill>
+                <a:latin typeface="Microsoft JhengHei" panose="020B0604030504040204" pitchFamily="34" charset="-120"/>
+                <a:ea typeface="Microsoft JhengHei" panose="020B0604030504040204" pitchFamily="34" charset="-120"/>
+              </a:endParaRPr>
+            </a:p>
+          </p:txBody>
+        </p:sp>
+        <p:sp>
+          <p:nvSpPr>
+            <p:cNvPr id="13" name="圓角矩形 12">
+              <a:extLst>
+                <a:ext uri="{FF2B5EF4-FFF2-40B4-BE49-F238E27FC236}">
+                  <a16:creationId xmlns:a16="http://schemas.microsoft.com/office/drawing/2014/main" id="{D280BB8B-8612-E343-AD11-006BCD9F0B9C}"/>
+                </a:ext>
+              </a:extLst>
+            </p:cNvPr>
+            <p:cNvSpPr/>
+            <p:nvPr/>
+          </p:nvSpPr>
+          <p:spPr>
+            <a:xfrm>
+              <a:off x="4187230" y="25978260"/>
+              <a:ext cx="2814140" cy="908288"/>
+            </a:xfrm>
+            <a:prstGeom prst="roundRect">
+              <a:avLst/>
+            </a:prstGeom>
+            <a:solidFill>
+              <a:schemeClr val="accent1"/>
+            </a:solidFill>
+          </p:spPr>
+          <p:style>
+            <a:lnRef idx="2">
+              <a:schemeClr val="accent1">
+                <a:shade val="50000"/>
+              </a:schemeClr>
+            </a:lnRef>
+            <a:fillRef idx="1">
+              <a:schemeClr val="accent1"/>
+            </a:fillRef>
+            <a:effectRef idx="0">
+              <a:schemeClr val="accent1"/>
+            </a:effectRef>
+            <a:fontRef idx="minor">
+              <a:schemeClr val="lt1"/>
+            </a:fontRef>
+          </p:style>
+          <p:txBody>
+            <a:bodyPr rtlCol="0" anchor="ctr"/>
+            <a:lstStyle/>
+            <a:p>
+              <a:pPr algn="ctr"/>
+              <a:r>
+                <a:rPr kumimoji="1" lang="en-US" altLang="zh-TW" sz="2000" dirty="0">
+                  <a:solidFill>
+                    <a:schemeClr val="bg1"/>
+                  </a:solidFill>
+                  <a:latin typeface="Microsoft JhengHei" panose="020B0604030504040204" pitchFamily="34" charset="-120"/>
+                  <a:ea typeface="Microsoft JhengHei" panose="020B0604030504040204" pitchFamily="34" charset="-120"/>
+                </a:rPr>
+                <a:t>Decision Tree</a:t>
+              </a:r>
+              <a:endParaRPr kumimoji="1" lang="zh-TW" altLang="en-US" sz="2000" dirty="0">
+                <a:solidFill>
+                  <a:schemeClr val="bg1"/>
+                </a:solidFill>
+                <a:latin typeface="Microsoft JhengHei" panose="020B0604030504040204" pitchFamily="34" charset="-120"/>
+                <a:ea typeface="Microsoft JhengHei" panose="020B0604030504040204" pitchFamily="34" charset="-120"/>
+              </a:endParaRPr>
+            </a:p>
+          </p:txBody>
+        </p:sp>
+        <p:sp>
+          <p:nvSpPr>
+            <p:cNvPr id="14" name="圓角矩形 13">
+              <a:extLst>
+                <a:ext uri="{FF2B5EF4-FFF2-40B4-BE49-F238E27FC236}">
+                  <a16:creationId xmlns:a16="http://schemas.microsoft.com/office/drawing/2014/main" id="{A5F7FEC7-A0E0-4740-838D-5C3D7B8A4B52}"/>
+                </a:ext>
+              </a:extLst>
+            </p:cNvPr>
+            <p:cNvSpPr/>
+            <p:nvPr/>
+          </p:nvSpPr>
+          <p:spPr>
+            <a:xfrm>
+              <a:off x="7427576" y="25978260"/>
+              <a:ext cx="2814140" cy="908288"/>
+            </a:xfrm>
+            <a:prstGeom prst="roundRect">
+              <a:avLst/>
+            </a:prstGeom>
+            <a:solidFill>
+              <a:schemeClr val="accent1"/>
+            </a:solidFill>
+          </p:spPr>
+          <p:style>
+            <a:lnRef idx="2">
+              <a:schemeClr val="accent1">
+                <a:shade val="50000"/>
+              </a:schemeClr>
+            </a:lnRef>
+            <a:fillRef idx="1">
+              <a:schemeClr val="accent1"/>
+            </a:fillRef>
+            <a:effectRef idx="0">
+              <a:schemeClr val="accent1"/>
+            </a:effectRef>
+            <a:fontRef idx="minor">
+              <a:schemeClr val="lt1"/>
+            </a:fontRef>
+          </p:style>
+          <p:txBody>
+            <a:bodyPr rtlCol="0" anchor="ctr"/>
+            <a:lstStyle/>
+            <a:p>
+              <a:pPr algn="ctr"/>
+              <a:r>
+                <a:rPr kumimoji="1" lang="en-US" altLang="zh-TW" sz="2000" dirty="0">
+                  <a:solidFill>
+                    <a:schemeClr val="bg1"/>
+                  </a:solidFill>
+                  <a:latin typeface="Microsoft JhengHei" panose="020B0604030504040204" pitchFamily="34" charset="-120"/>
+                  <a:ea typeface="Microsoft JhengHei" panose="020B0604030504040204" pitchFamily="34" charset="-120"/>
+                </a:rPr>
+                <a:t>Ensemble</a:t>
+              </a:r>
+              <a:endParaRPr kumimoji="1" lang="zh-TW" altLang="en-US" sz="2000" dirty="0">
+                <a:solidFill>
+                  <a:schemeClr val="bg1"/>
+                </a:solidFill>
+                <a:latin typeface="Microsoft JhengHei" panose="020B0604030504040204" pitchFamily="34" charset="-120"/>
+                <a:ea typeface="Microsoft JhengHei" panose="020B0604030504040204" pitchFamily="34" charset="-120"/>
+              </a:endParaRPr>
+            </a:p>
+          </p:txBody>
+        </p:sp>
+        <p:sp>
+          <p:nvSpPr>
+            <p:cNvPr id="15" name="圓角矩形 14">
+              <a:extLst>
+                <a:ext uri="{FF2B5EF4-FFF2-40B4-BE49-F238E27FC236}">
+                  <a16:creationId xmlns:a16="http://schemas.microsoft.com/office/drawing/2014/main" id="{58F57881-3C14-5244-BF1F-48FD8CC91230}"/>
+                </a:ext>
+              </a:extLst>
+            </p:cNvPr>
+            <p:cNvSpPr/>
+            <p:nvPr/>
+          </p:nvSpPr>
+          <p:spPr>
+            <a:xfrm>
+              <a:off x="2573583" y="23117199"/>
+              <a:ext cx="5903576" cy="908288"/>
+            </a:xfrm>
+            <a:prstGeom prst="roundRect">
+              <a:avLst/>
+            </a:prstGeom>
+            <a:solidFill>
+              <a:schemeClr val="accent1"/>
+            </a:solidFill>
+          </p:spPr>
+          <p:style>
+            <a:lnRef idx="2">
+              <a:schemeClr val="accent1">
+                <a:shade val="50000"/>
+              </a:schemeClr>
+            </a:lnRef>
+            <a:fillRef idx="1">
+              <a:schemeClr val="accent1"/>
+            </a:fillRef>
+            <a:effectRef idx="0">
+              <a:schemeClr val="accent1"/>
+            </a:effectRef>
+            <a:fontRef idx="minor">
+              <a:schemeClr val="lt1"/>
+            </a:fontRef>
+          </p:style>
+          <p:txBody>
+            <a:bodyPr rtlCol="0" anchor="ctr"/>
+            <a:lstStyle/>
+            <a:p>
+              <a:pPr algn="ctr"/>
+              <a:r>
+                <a:rPr kumimoji="1" lang="en-US" altLang="zh-TW" sz="2000" dirty="0">
+                  <a:solidFill>
+                    <a:schemeClr val="bg1"/>
+                  </a:solidFill>
+                  <a:latin typeface="Microsoft JhengHei" panose="020B0604030504040204" pitchFamily="34" charset="-120"/>
+                  <a:ea typeface="Microsoft JhengHei" panose="020B0604030504040204" pitchFamily="34" charset="-120"/>
+                </a:rPr>
+                <a:t>Upload data to </a:t>
+              </a:r>
+              <a:r>
+                <a:rPr kumimoji="1" lang="en-US" altLang="zh-TW" sz="2000" b="1" dirty="0">
+                  <a:solidFill>
+                    <a:schemeClr val="bg1"/>
+                  </a:solidFill>
+                  <a:latin typeface="Microsoft JhengHei" panose="020B0604030504040204" pitchFamily="34" charset="-120"/>
+                  <a:ea typeface="Microsoft JhengHei" panose="020B0604030504040204" pitchFamily="34" charset="-120"/>
+                </a:rPr>
+                <a:t>BigML</a:t>
+              </a:r>
+              <a:endParaRPr kumimoji="1" lang="zh-TW" altLang="en-US" sz="2000" b="1" dirty="0">
+                <a:solidFill>
+                  <a:schemeClr val="bg1"/>
+                </a:solidFill>
+                <a:latin typeface="Microsoft JhengHei" panose="020B0604030504040204" pitchFamily="34" charset="-120"/>
+                <a:ea typeface="Microsoft JhengHei" panose="020B0604030504040204" pitchFamily="34" charset="-120"/>
+              </a:endParaRPr>
+            </a:p>
+          </p:txBody>
+        </p:sp>
+        <p:sp>
+          <p:nvSpPr>
+            <p:cNvPr id="16" name="向下箭號 15">
+              <a:extLst>
+                <a:ext uri="{FF2B5EF4-FFF2-40B4-BE49-F238E27FC236}">
+                  <a16:creationId xmlns:a16="http://schemas.microsoft.com/office/drawing/2014/main" id="{C6A4A9BC-03D2-7441-B806-AE833D5F5ECB}"/>
+                </a:ext>
+              </a:extLst>
+            </p:cNvPr>
+            <p:cNvSpPr/>
+            <p:nvPr/>
+          </p:nvSpPr>
+          <p:spPr>
+            <a:xfrm>
+              <a:off x="4976965" y="24028156"/>
+              <a:ext cx="1338107" cy="479109"/>
+            </a:xfrm>
+            <a:prstGeom prst="downArrow">
+              <a:avLst/>
+            </a:prstGeom>
+            <a:solidFill>
+              <a:schemeClr val="tx2">
+                <a:lumMod val="75000"/>
+              </a:schemeClr>
+            </a:solidFill>
+          </p:spPr>
+          <p:style>
+            <a:lnRef idx="2">
+              <a:schemeClr val="accent1">
+                <a:shade val="50000"/>
+              </a:schemeClr>
+            </a:lnRef>
+            <a:fillRef idx="1">
+              <a:schemeClr val="accent1"/>
+            </a:fillRef>
+            <a:effectRef idx="0">
+              <a:schemeClr val="accent1"/>
+            </a:effectRef>
+            <a:fontRef idx="minor">
+              <a:schemeClr val="lt1"/>
+            </a:fontRef>
+          </p:style>
+          <p:txBody>
+            <a:bodyPr rtlCol="0" anchor="ctr"/>
+            <a:lstStyle/>
+            <a:p>
+              <a:pPr algn="ctr"/>
+              <a:endParaRPr kumimoji="1" lang="zh-TW" altLang="en-US" sz="1200" dirty="0"/>
+            </a:p>
+          </p:txBody>
+        </p:sp>
+        <p:sp>
+          <p:nvSpPr>
+            <p:cNvPr id="17" name="向下箭號 16">
+              <a:extLst>
+                <a:ext uri="{FF2B5EF4-FFF2-40B4-BE49-F238E27FC236}">
+                  <a16:creationId xmlns:a16="http://schemas.microsoft.com/office/drawing/2014/main" id="{A9382121-20AF-8D49-81E7-AA00999743A4}"/>
+                </a:ext>
+              </a:extLst>
+            </p:cNvPr>
+            <p:cNvSpPr/>
+            <p:nvPr/>
+          </p:nvSpPr>
+          <p:spPr>
+            <a:xfrm>
+              <a:off x="2242574" y="25483873"/>
+              <a:ext cx="1338107" cy="479109"/>
+            </a:xfrm>
+            <a:prstGeom prst="downArrow">
+              <a:avLst/>
+            </a:prstGeom>
+            <a:solidFill>
+              <a:schemeClr val="tx2">
+                <a:lumMod val="75000"/>
+              </a:schemeClr>
+            </a:solidFill>
+          </p:spPr>
+          <p:style>
+            <a:lnRef idx="2">
+              <a:schemeClr val="accent1">
+                <a:shade val="50000"/>
+              </a:schemeClr>
+            </a:lnRef>
+            <a:fillRef idx="1">
+              <a:schemeClr val="accent1"/>
+            </a:fillRef>
+            <a:effectRef idx="0">
+              <a:schemeClr val="accent1"/>
+            </a:effectRef>
+            <a:fontRef idx="minor">
+              <a:schemeClr val="lt1"/>
+            </a:fontRef>
+          </p:style>
+          <p:txBody>
+            <a:bodyPr rtlCol="0" anchor="ctr"/>
+            <a:lstStyle/>
+            <a:p>
+              <a:pPr algn="ctr"/>
+              <a:endParaRPr kumimoji="1" lang="zh-TW" altLang="en-US" sz="1200" dirty="0"/>
+            </a:p>
+          </p:txBody>
+        </p:sp>
+        <p:sp>
+          <p:nvSpPr>
+            <p:cNvPr id="18" name="向下箭號 17">
+              <a:extLst>
+                <a:ext uri="{FF2B5EF4-FFF2-40B4-BE49-F238E27FC236}">
+                  <a16:creationId xmlns:a16="http://schemas.microsoft.com/office/drawing/2014/main" id="{77C85F1E-E056-1D4A-930C-1976EE84291C}"/>
+                </a:ext>
+              </a:extLst>
+            </p:cNvPr>
+            <p:cNvSpPr/>
+            <p:nvPr/>
+          </p:nvSpPr>
+          <p:spPr>
+            <a:xfrm>
+              <a:off x="5015143" y="26915350"/>
+              <a:ext cx="1338107" cy="479109"/>
+            </a:xfrm>
+            <a:prstGeom prst="downArrow">
+              <a:avLst/>
+            </a:prstGeom>
+            <a:solidFill>
+              <a:schemeClr val="tx2">
+                <a:lumMod val="75000"/>
+              </a:schemeClr>
+            </a:solidFill>
+          </p:spPr>
+          <p:style>
+            <a:lnRef idx="2">
+              <a:schemeClr val="accent1">
+                <a:shade val="50000"/>
+              </a:schemeClr>
+            </a:lnRef>
+            <a:fillRef idx="1">
+              <a:schemeClr val="accent1"/>
+            </a:fillRef>
+            <a:effectRef idx="0">
+              <a:schemeClr val="accent1"/>
+            </a:effectRef>
+            <a:fontRef idx="minor">
+              <a:schemeClr val="lt1"/>
+            </a:fontRef>
+          </p:style>
+          <p:txBody>
+            <a:bodyPr rtlCol="0" anchor="ctr"/>
+            <a:lstStyle/>
+            <a:p>
+              <a:pPr algn="ctr"/>
+              <a:endParaRPr kumimoji="1" lang="zh-TW" altLang="en-US" sz="1200" dirty="0"/>
+            </a:p>
+          </p:txBody>
+        </p:sp>
+        <p:sp>
+          <p:nvSpPr>
+            <p:cNvPr id="19" name="向下箭號 18">
+              <a:extLst>
+                <a:ext uri="{FF2B5EF4-FFF2-40B4-BE49-F238E27FC236}">
+                  <a16:creationId xmlns:a16="http://schemas.microsoft.com/office/drawing/2014/main" id="{CD6B3275-3FA8-A64B-B244-BBFC67C8B7A1}"/>
+                </a:ext>
+              </a:extLst>
+            </p:cNvPr>
+            <p:cNvSpPr/>
+            <p:nvPr/>
+          </p:nvSpPr>
+          <p:spPr>
+            <a:xfrm>
+              <a:off x="7455579" y="25483871"/>
+              <a:ext cx="1338107" cy="479109"/>
+            </a:xfrm>
+            <a:prstGeom prst="downArrow">
+              <a:avLst/>
+            </a:prstGeom>
+            <a:solidFill>
+              <a:schemeClr val="tx2">
+                <a:lumMod val="75000"/>
+              </a:schemeClr>
+            </a:solidFill>
+          </p:spPr>
+          <p:style>
+            <a:lnRef idx="2">
+              <a:schemeClr val="accent1">
+                <a:shade val="50000"/>
+              </a:schemeClr>
+            </a:lnRef>
+            <a:fillRef idx="1">
+              <a:schemeClr val="accent1"/>
+            </a:fillRef>
+            <a:effectRef idx="0">
+              <a:schemeClr val="accent1"/>
+            </a:effectRef>
+            <a:fontRef idx="minor">
+              <a:schemeClr val="lt1"/>
+            </a:fontRef>
+          </p:style>
+          <p:txBody>
+            <a:bodyPr rtlCol="0" anchor="ctr"/>
+            <a:lstStyle/>
+            <a:p>
+              <a:pPr algn="ctr"/>
+              <a:endParaRPr kumimoji="1" lang="zh-TW" altLang="en-US" sz="1200" dirty="0"/>
+            </a:p>
+          </p:txBody>
+        </p:sp>
+        <p:sp>
+          <p:nvSpPr>
+            <p:cNvPr id="20" name="圓角矩形 19">
+              <a:extLst>
+                <a:ext uri="{FF2B5EF4-FFF2-40B4-BE49-F238E27FC236}">
+                  <a16:creationId xmlns:a16="http://schemas.microsoft.com/office/drawing/2014/main" id="{8423031B-48CE-AC46-A388-08C2739A7794}"/>
+                </a:ext>
+              </a:extLst>
+            </p:cNvPr>
+            <p:cNvSpPr/>
+            <p:nvPr/>
+          </p:nvSpPr>
+          <p:spPr>
+            <a:xfrm>
+              <a:off x="1166818" y="28500085"/>
+              <a:ext cx="4278907" cy="1093120"/>
+            </a:xfrm>
+            <a:prstGeom prst="roundRect">
+              <a:avLst/>
+            </a:prstGeom>
+            <a:solidFill>
+              <a:schemeClr val="accent1"/>
+            </a:solidFill>
+          </p:spPr>
+          <p:style>
+            <a:lnRef idx="2">
+              <a:schemeClr val="accent1">
+                <a:shade val="50000"/>
+              </a:schemeClr>
+            </a:lnRef>
+            <a:fillRef idx="1">
+              <a:schemeClr val="accent1"/>
+            </a:fillRef>
+            <a:effectRef idx="0">
+              <a:schemeClr val="accent1"/>
+            </a:effectRef>
+            <a:fontRef idx="minor">
+              <a:schemeClr val="lt1"/>
+            </a:fontRef>
+          </p:style>
+          <p:txBody>
+            <a:bodyPr rtlCol="0" anchor="ctr"/>
+            <a:lstStyle/>
+            <a:p>
+              <a:pPr algn="ctr"/>
+              <a:r>
+                <a:rPr kumimoji="1" lang="en-US" altLang="zh-TW" sz="2000" dirty="0">
+                  <a:solidFill>
+                    <a:schemeClr val="bg1"/>
+                  </a:solidFill>
+                  <a:latin typeface="Microsoft JhengHei" panose="020B0604030504040204" pitchFamily="34" charset="-120"/>
+                  <a:ea typeface="Microsoft JhengHei" panose="020B0604030504040204" pitchFamily="34" charset="-120"/>
+                </a:rPr>
+                <a:t>Local : </a:t>
+              </a:r>
+            </a:p>
+            <a:p>
+              <a:pPr algn="ctr"/>
+              <a:r>
+                <a:rPr kumimoji="1" lang="en-US" altLang="zh-TW" sz="2000" dirty="0">
+                  <a:solidFill>
+                    <a:schemeClr val="bg1"/>
+                  </a:solidFill>
+                  <a:latin typeface="Microsoft JhengHei" panose="020B0604030504040204" pitchFamily="34" charset="-120"/>
+                  <a:ea typeface="Microsoft JhengHei" panose="020B0604030504040204" pitchFamily="34" charset="-120"/>
+                </a:rPr>
+                <a:t>Model parameters</a:t>
+              </a:r>
+              <a:endParaRPr kumimoji="1" lang="zh-TW" altLang="en-US" sz="2000" dirty="0">
+                <a:solidFill>
+                  <a:schemeClr val="bg1"/>
+                </a:solidFill>
+                <a:latin typeface="Microsoft JhengHei" panose="020B0604030504040204" pitchFamily="34" charset="-120"/>
+                <a:ea typeface="Microsoft JhengHei" panose="020B0604030504040204" pitchFamily="34" charset="-120"/>
+              </a:endParaRPr>
+            </a:p>
+          </p:txBody>
+        </p:sp>
+        <p:sp>
+          <p:nvSpPr>
+            <p:cNvPr id="21" name="圓角矩形 20">
+              <a:extLst>
+                <a:ext uri="{FF2B5EF4-FFF2-40B4-BE49-F238E27FC236}">
+                  <a16:creationId xmlns:a16="http://schemas.microsoft.com/office/drawing/2014/main" id="{1906E4A1-3BA2-3C4D-9731-9ADAB56A87A9}"/>
+                </a:ext>
+              </a:extLst>
+            </p:cNvPr>
+            <p:cNvSpPr/>
+            <p:nvPr/>
+          </p:nvSpPr>
+          <p:spPr>
+            <a:xfrm>
+              <a:off x="5571000" y="28500085"/>
+              <a:ext cx="4601420" cy="1088702"/>
+            </a:xfrm>
+            <a:prstGeom prst="roundRect">
+              <a:avLst/>
+            </a:prstGeom>
+            <a:solidFill>
+              <a:schemeClr val="accent1"/>
+            </a:solidFill>
+          </p:spPr>
+          <p:style>
+            <a:lnRef idx="2">
+              <a:schemeClr val="accent1">
+                <a:shade val="50000"/>
+              </a:schemeClr>
+            </a:lnRef>
+            <a:fillRef idx="1">
+              <a:schemeClr val="accent1"/>
+            </a:fillRef>
+            <a:effectRef idx="0">
+              <a:schemeClr val="accent1"/>
+            </a:effectRef>
+            <a:fontRef idx="minor">
+              <a:schemeClr val="lt1"/>
+            </a:fontRef>
+          </p:style>
+          <p:txBody>
+            <a:bodyPr rtlCol="0" anchor="ctr"/>
+            <a:lstStyle/>
+            <a:p>
+              <a:pPr algn="ctr"/>
+              <a:r>
+                <a:rPr kumimoji="1" lang="en-US" altLang="zh-TW" sz="2000" dirty="0">
+                  <a:solidFill>
+                    <a:schemeClr val="bg1"/>
+                  </a:solidFill>
+                  <a:latin typeface="Microsoft JhengHei" panose="020B0604030504040204" pitchFamily="34" charset="-120"/>
+                  <a:ea typeface="Microsoft JhengHei" panose="020B0604030504040204" pitchFamily="34" charset="-120"/>
+                </a:rPr>
+                <a:t>BigML Server : </a:t>
+              </a:r>
+            </a:p>
+            <a:p>
+              <a:pPr algn="ctr"/>
+              <a:r>
+                <a:rPr kumimoji="1" lang="en-US" altLang="zh-TW" sz="2000" dirty="0">
+                  <a:solidFill>
+                    <a:schemeClr val="bg1"/>
+                  </a:solidFill>
+                  <a:latin typeface="Microsoft JhengHei" panose="020B0604030504040204" pitchFamily="34" charset="-120"/>
+                  <a:ea typeface="Microsoft JhengHei" panose="020B0604030504040204" pitchFamily="34" charset="-120"/>
+                </a:rPr>
+                <a:t>Available for prediction</a:t>
+              </a:r>
+            </a:p>
+          </p:txBody>
+        </p:sp>
+        <p:sp>
+          <p:nvSpPr>
+            <p:cNvPr id="22" name="向下箭號 21">
+              <a:extLst>
+                <a:ext uri="{FF2B5EF4-FFF2-40B4-BE49-F238E27FC236}">
+                  <a16:creationId xmlns:a16="http://schemas.microsoft.com/office/drawing/2014/main" id="{0F8DE2E6-1B71-A54D-92CC-42FD0B41B360}"/>
+                </a:ext>
+              </a:extLst>
+            </p:cNvPr>
+            <p:cNvSpPr/>
+            <p:nvPr/>
+          </p:nvSpPr>
+          <p:spPr>
+            <a:xfrm>
+              <a:off x="5077890" y="25515957"/>
+              <a:ext cx="1338107" cy="479109"/>
+            </a:xfrm>
+            <a:prstGeom prst="downArrow">
+              <a:avLst/>
+            </a:prstGeom>
+            <a:solidFill>
+              <a:schemeClr val="tx2">
+                <a:lumMod val="75000"/>
+              </a:schemeClr>
+            </a:solidFill>
+          </p:spPr>
+          <p:style>
+            <a:lnRef idx="2">
+              <a:schemeClr val="accent1">
+                <a:shade val="50000"/>
+              </a:schemeClr>
+            </a:lnRef>
+            <a:fillRef idx="1">
+              <a:schemeClr val="accent1"/>
+            </a:fillRef>
+            <a:effectRef idx="0">
+              <a:schemeClr val="accent1"/>
+            </a:effectRef>
+            <a:fontRef idx="minor">
+              <a:schemeClr val="lt1"/>
+            </a:fontRef>
+          </p:style>
+          <p:txBody>
+            <a:bodyPr rtlCol="0" anchor="ctr"/>
+            <a:lstStyle/>
+            <a:p>
+              <a:pPr algn="ctr"/>
+              <a:endParaRPr kumimoji="1" lang="zh-TW" altLang="en-US" sz="1200" dirty="0"/>
+            </a:p>
+          </p:txBody>
+        </p:sp>
+        <p:sp>
+          <p:nvSpPr>
+            <p:cNvPr id="23" name="圓角矩形 22">
+              <a:extLst>
+                <a:ext uri="{FF2B5EF4-FFF2-40B4-BE49-F238E27FC236}">
+                  <a16:creationId xmlns:a16="http://schemas.microsoft.com/office/drawing/2014/main" id="{76755201-5237-B444-866E-41D89F55A754}"/>
+                </a:ext>
+              </a:extLst>
+            </p:cNvPr>
+            <p:cNvSpPr/>
+            <p:nvPr/>
+          </p:nvSpPr>
+          <p:spPr>
+            <a:xfrm>
+              <a:off x="2766070" y="27429677"/>
+              <a:ext cx="5903576" cy="908288"/>
+            </a:xfrm>
+            <a:prstGeom prst="roundRect">
+              <a:avLst/>
+            </a:prstGeom>
+            <a:solidFill>
+              <a:schemeClr val="accent1"/>
+            </a:solidFill>
+          </p:spPr>
+          <p:style>
+            <a:lnRef idx="2">
+              <a:schemeClr val="accent1">
+                <a:shade val="50000"/>
+              </a:schemeClr>
+            </a:lnRef>
+            <a:fillRef idx="1">
+              <a:schemeClr val="accent1"/>
+            </a:fillRef>
+            <a:effectRef idx="0">
+              <a:schemeClr val="accent1"/>
+            </a:effectRef>
+            <a:fontRef idx="minor">
+              <a:schemeClr val="lt1"/>
+            </a:fontRef>
+          </p:style>
+          <p:txBody>
+            <a:bodyPr rtlCol="0" anchor="ctr"/>
+            <a:lstStyle/>
+            <a:p>
+              <a:pPr algn="ctr"/>
+              <a:r>
+                <a:rPr kumimoji="1" lang="en-US" altLang="zh-TW" sz="2000" b="1" u="sng" dirty="0">
+                  <a:solidFill>
+                    <a:schemeClr val="bg1"/>
+                  </a:solidFill>
+                  <a:latin typeface="Microsoft JhengHei" panose="020B0604030504040204" pitchFamily="34" charset="-120"/>
+                  <a:ea typeface="Microsoft JhengHei" panose="020B0604030504040204" pitchFamily="34" charset="-120"/>
+                </a:rPr>
+                <a:t>Target Model</a:t>
+              </a:r>
+              <a:r>
+                <a:rPr kumimoji="1" lang="en-US" altLang="zh-TW" sz="2000" b="1" dirty="0">
+                  <a:solidFill>
+                    <a:schemeClr val="bg1"/>
+                  </a:solidFill>
+                  <a:latin typeface="Microsoft JhengHei" panose="020B0604030504040204" pitchFamily="34" charset="-120"/>
+                  <a:ea typeface="Microsoft JhengHei" panose="020B0604030504040204" pitchFamily="34" charset="-120"/>
+                </a:rPr>
+                <a:t> </a:t>
+              </a:r>
+              <a:r>
+                <a:rPr kumimoji="1" lang="en-US" altLang="zh-TW" sz="2000" dirty="0">
+                  <a:solidFill>
+                    <a:schemeClr val="bg1"/>
+                  </a:solidFill>
+                  <a:latin typeface="Microsoft JhengHei" panose="020B0604030504040204" pitchFamily="34" charset="-120"/>
+                  <a:ea typeface="Microsoft JhengHei" panose="020B0604030504040204" pitchFamily="34" charset="-120"/>
+                </a:rPr>
+                <a:t>Available</a:t>
+              </a:r>
+              <a:endParaRPr kumimoji="1" lang="zh-TW" altLang="en-US" sz="2000" dirty="0">
+                <a:solidFill>
+                  <a:schemeClr val="bg1"/>
+                </a:solidFill>
+                <a:latin typeface="Microsoft JhengHei" panose="020B0604030504040204" pitchFamily="34" charset="-120"/>
+                <a:ea typeface="Microsoft JhengHei" panose="020B0604030504040204" pitchFamily="34" charset="-120"/>
+              </a:endParaRPr>
+            </a:p>
+          </p:txBody>
+        </p:sp>
+      </p:grpSp>
+    </p:spTree>
+    <p:extLst>
+      <p:ext uri="{BB962C8B-B14F-4D97-AF65-F5344CB8AC3E}">
+        <p14:creationId xmlns:p14="http://schemas.microsoft.com/office/powerpoint/2010/main" val="318089992"/>
+      </p:ext>
+    </p:extLst>
+  </p:cSld>
+  <p:clrMapOvr>
+    <a:masterClrMapping/>
+  </p:clrMapOvr>
+</p:sld>
+</file>
+
+<file path=ppt/slides/slide6.xml><?xml version="1.0" encoding="utf-8"?>
+<p:sld xmlns:a="http://schemas.openxmlformats.org/drawingml/2006/main" xmlns:r="http://schemas.openxmlformats.org/officeDocument/2006/relationships" xmlns:p="http://schemas.openxmlformats.org/presentationml/2006/main">
+  <p:cSld>
+    <p:spTree>
+      <p:nvGrpSpPr>
+        <p:cNvPr id="1" name=""/>
+        <p:cNvGrpSpPr/>
+        <p:nvPr/>
+      </p:nvGrpSpPr>
+      <p:grpSpPr>
+        <a:xfrm>
+          <a:off x="0" y="0"/>
+          <a:ext cx="0" cy="0"/>
+          <a:chOff x="0" y="0"/>
+          <a:chExt cx="0" cy="0"/>
+        </a:xfrm>
+      </p:grpSpPr>
+      <p:sp>
+        <p:nvSpPr>
+          <p:cNvPr id="2" name="標題 1">
+            <a:extLst>
+              <a:ext uri="{FF2B5EF4-FFF2-40B4-BE49-F238E27FC236}">
                 <a16:creationId xmlns:a16="http://schemas.microsoft.com/office/drawing/2014/main" id="{A9E6EF75-9FE7-4349-B9EB-55747C4ECCCF}"/>
               </a:ext>
             </a:extLst>
@@ -8006,18 +8690,32 @@
         </p:nvSpPr>
         <p:spPr/>
         <p:txBody>
-          <a:bodyPr/>
+          <a:bodyPr>
+            <a:normAutofit/>
+          </a:bodyPr>
           <a:lstStyle/>
           <a:p>
             <a:r>
-              <a:rPr kumimoji="1" lang="zh-CN" altLang="en-US" dirty="0"/>
-              <a:t>改變參數偷取</a:t>
+              <a:rPr kumimoji="1" lang="en-US" altLang="zh-CN" b="1" u="sng" dirty="0" err="1"/>
+              <a:t>Trainning</a:t>
             </a:r>
             <a:r>
-              <a:rPr kumimoji="1" lang="en-US" altLang="zh-CN" dirty="0"/>
-              <a:t> Model</a:t>
+              <a:rPr kumimoji="1" lang="en-US" altLang="zh-CN" b="1" u="sng" dirty="0"/>
+              <a:t> of </a:t>
             </a:r>
-            <a:endParaRPr kumimoji="1" lang="zh-TW" altLang="en-US" dirty="0"/>
+            <a:r>
+              <a:rPr kumimoji="1" lang="en-US" altLang="zh-CN" b="1" u="sng" dirty="0" err="1"/>
+              <a:t>Contorl</a:t>
+            </a:r>
+            <a:r>
+              <a:rPr kumimoji="1" lang="en-US" altLang="zh-CN" b="1" u="sng" dirty="0"/>
+              <a:t>/Copy </a:t>
+            </a:r>
+            <a:r>
+              <a:rPr kumimoji="1" lang="en-US" altLang="zh-CN" b="1" u="sng" dirty="0"/>
+              <a:t>Model</a:t>
+            </a:r>
+            <a:endParaRPr kumimoji="1" lang="zh-TW" altLang="en-US" b="1" u="sng" dirty="0"/>
           </a:p>
         </p:txBody>
       </p:sp>
@@ -9416,7 +10114,7 @@
 </p:sld>
 </file>
 
-<file path=ppt/slides/slide6.xml><?xml version="1.0" encoding="utf-8"?>
+<file path=ppt/slides/slide7.xml><?xml version="1.0" encoding="utf-8"?>
 <p:sld xmlns:a="http://schemas.openxmlformats.org/drawingml/2006/main" xmlns:r="http://schemas.openxmlformats.org/officeDocument/2006/relationships" xmlns:p="http://schemas.openxmlformats.org/presentationml/2006/main">
   <p:cSld>
     <p:spTree>
@@ -9455,9 +10153,10 @@
           <a:lstStyle/>
           <a:p>
             <a:r>
-              <a:rPr kumimoji="1" lang="zh-TW" altLang="en-US" dirty="0"/>
-              <a:t>結論</a:t>
+              <a:rPr kumimoji="1" lang="en-US" altLang="zh-TW" dirty="0" smtClean="0"/>
+              <a:t>Conclusion</a:t>
             </a:r>
+            <a:endParaRPr kumimoji="1" lang="zh-TW" altLang="en-US" dirty="0"/>
           </a:p>
         </p:txBody>
       </p:sp>

</xml_diff>

<commit_message>
fix graph in poster and ppt
</commit_message>
<xml_diff>
--- a/final_demo.pptx
+++ b/final_demo.pptx
@@ -8857,7 +8857,7 @@
         </p:nvGrpSpPr>
         <p:grpSpPr>
           <a:xfrm>
-            <a:off x="1729724" y="1327518"/>
+            <a:off x="1729725" y="1327518"/>
             <a:ext cx="7271774" cy="5356697"/>
             <a:chOff x="12180790" y="11328000"/>
             <a:chExt cx="8684076" cy="7806187"/>
@@ -9007,8 +9007,8 @@
           </p:nvSpPr>
           <p:spPr>
             <a:xfrm>
-              <a:off x="12598169" y="11328000"/>
-              <a:ext cx="4278949" cy="762476"/>
+              <a:off x="14458582" y="11328000"/>
+              <a:ext cx="3970711" cy="762476"/>
             </a:xfrm>
             <a:prstGeom prst="rect">
               <a:avLst/>
@@ -9026,12 +9026,16 @@
                 <a:t>( </a:t>
               </a:r>
               <a:r>
-                <a:rPr kumimoji="1" lang="en-US" altLang="zh-CN" sz="2800" b="1" dirty="0" err="1"/>
-                <a:t>X_copy_testing</a:t>
+                <a:rPr kumimoji="1" lang="en-US" altLang="zh-CN" sz="2800" b="1" dirty="0" err="1" smtClean="0"/>
+                <a:t>X_training_data</a:t>
+              </a:r>
+              <a:r>
+                <a:rPr kumimoji="1" lang="en-US" altLang="zh-CN" sz="2800" dirty="0" smtClean="0"/>
+                <a:t> </a:t>
               </a:r>
               <a:r>
                 <a:rPr kumimoji="1" lang="en-US" altLang="zh-CN" sz="2800" dirty="0"/>
-                <a:t> )</a:t>
+                <a:t>)</a:t>
               </a:r>
             </a:p>
           </p:txBody>
@@ -9115,8 +9119,8 @@
           </p:nvSpPr>
           <p:spPr>
             <a:xfrm>
-              <a:off x="13837890" y="14624456"/>
-              <a:ext cx="7026970" cy="672774"/>
+              <a:off x="12916632" y="14624456"/>
+              <a:ext cx="7026970" cy="672773"/>
             </a:xfrm>
             <a:prstGeom prst="rect">
               <a:avLst/>
@@ -9167,7 +9171,7 @@
           </p:nvSpPr>
           <p:spPr>
             <a:xfrm>
-              <a:off x="14521580" y="12020204"/>
+              <a:off x="15954870" y="12059072"/>
               <a:ext cx="950494" cy="684072"/>
             </a:xfrm>
             <a:prstGeom prst="downArrow">
@@ -9218,7 +9222,7 @@
           </p:nvSpPr>
           <p:spPr>
             <a:xfrm>
-              <a:off x="15651380" y="14238340"/>
+              <a:off x="15855086" y="14214245"/>
               <a:ext cx="1338107" cy="479109"/>
             </a:xfrm>
             <a:prstGeom prst="downArrow">
@@ -9334,8 +9338,8 @@
           </p:nvSpPr>
           <p:spPr>
             <a:xfrm>
-              <a:off x="12697540" y="12088404"/>
-              <a:ext cx="403521" cy="3919308"/>
+              <a:off x="12697540" y="11629088"/>
+              <a:ext cx="403521" cy="4378625"/>
             </a:xfrm>
             <a:prstGeom prst="downArrow">
               <a:avLst/>
@@ -9385,8 +9389,8 @@
           </p:nvSpPr>
           <p:spPr>
             <a:xfrm>
-              <a:off x="17899745" y="15418137"/>
-              <a:ext cx="403521" cy="589574"/>
+              <a:off x="17899745" y="15193437"/>
+              <a:ext cx="403521" cy="814276"/>
             </a:xfrm>
             <a:prstGeom prst="downArrow">
               <a:avLst/>
@@ -9436,8 +9440,8 @@
           </p:nvSpPr>
           <p:spPr>
             <a:xfrm>
-              <a:off x="13098324" y="12079766"/>
-              <a:ext cx="204213" cy="3346876"/>
+              <a:off x="18338654" y="11615349"/>
+              <a:ext cx="1769465" cy="195996"/>
             </a:xfrm>
             <a:prstGeom prst="rect">
               <a:avLst/>
@@ -9487,8 +9491,8 @@
           </p:nvSpPr>
           <p:spPr>
             <a:xfrm rot="5400000">
-              <a:off x="15442813" y="13073648"/>
-              <a:ext cx="204213" cy="4893192"/>
+              <a:off x="13554984" y="10844749"/>
+              <a:ext cx="204214" cy="1728977"/>
             </a:xfrm>
             <a:prstGeom prst="rect">
               <a:avLst/>
@@ -9538,8 +9542,8 @@
           </p:nvSpPr>
           <p:spPr>
             <a:xfrm>
-              <a:off x="19820292" y="15299548"/>
-              <a:ext cx="403521" cy="708164"/>
+              <a:off x="19820291" y="11629088"/>
+              <a:ext cx="403521" cy="4378624"/>
             </a:xfrm>
             <a:prstGeom prst="downArrow">
               <a:avLst/>

</xml_diff>